<commit_message>
the slides updated with sample code
</commit_message>
<xml_diff>
--- a/src/main/resources/slides.pptx
+++ b/src/main/resources/slides.pptx
@@ -19,16 +19,16 @@
     <p:sldId id="281" r:id="rId11"/>
     <p:sldId id="279" r:id="rId12"/>
     <p:sldId id="282" r:id="rId13"/>
-    <p:sldId id="284" r:id="rId14"/>
-    <p:sldId id="283" r:id="rId15"/>
+    <p:sldId id="283" r:id="rId14"/>
+    <p:sldId id="284" r:id="rId15"/>
     <p:sldId id="285" r:id="rId16"/>
     <p:sldId id="286" r:id="rId17"/>
     <p:sldId id="287" r:id="rId18"/>
     <p:sldId id="288" r:id="rId19"/>
     <p:sldId id="289" r:id="rId20"/>
     <p:sldId id="291" r:id="rId21"/>
-    <p:sldId id="292" r:id="rId22"/>
-    <p:sldId id="293" r:id="rId23"/>
+    <p:sldId id="293" r:id="rId22"/>
+    <p:sldId id="292" r:id="rId23"/>
     <p:sldId id="294" r:id="rId24"/>
     <p:sldId id="295" r:id="rId25"/>
     <p:sldId id="290" r:id="rId26"/>
@@ -286,7 +286,7 @@
           <a:p>
             <a:fld id="{D767EAEA-49F6-47D1-81B5-6AE13276E2F7}" type="datetimeFigureOut">
               <a:rPr lang="pl-PL" smtClean="0"/>
-              <a:t>22.01.2019</a:t>
+              <a:t>24.01.2019</a:t>
             </a:fld>
             <a:endParaRPr lang="pl-PL"/>
           </a:p>
@@ -455,7 +455,7 @@
           <a:p>
             <a:fld id="{153FA37D-DE2B-47E9-A168-88AE1559A114}" type="datetimeFigureOut">
               <a:rPr lang="pl-PL" smtClean="0"/>
-              <a:t>22.01.2019</a:t>
+              <a:t>24.01.2019</a:t>
             </a:fld>
             <a:endParaRPr lang="pl-PL"/>
           </a:p>
@@ -880,168 +880,6 @@
           <a:bodyPr/>
           <a:lstStyle/>
           <a:p>
-            <a:r>
-              <a:rPr lang="en-US" dirty="0"/>
-              <a:t>Performance</a:t>
-            </a:r>
-            <a:r>
-              <a:rPr lang="pl-PL" dirty="0"/>
-              <a:t> - Spark jest napisany w Scali, dzięki czemu uzyskujemy najlepszą (native) wydajność i największą spójność i pokrycie między API Scali i API Sparka.</a:t>
-            </a:r>
-          </a:p>
-          <a:p>
-            <a:r>
-              <a:rPr lang="en-US" dirty="0"/>
-              <a:t>Type Safety</a:t>
-            </a:r>
-            <a:r>
-              <a:rPr lang="pl-PL" dirty="0"/>
-              <a:t> – w </a:t>
-            </a:r>
-            <a:r>
-              <a:rPr lang="pl-PL" dirty="0" err="1"/>
-              <a:t>prówaniu</a:t>
-            </a:r>
-            <a:r>
-              <a:rPr lang="pl-PL" dirty="0"/>
-              <a:t> do </a:t>
-            </a:r>
-            <a:r>
-              <a:rPr lang="pl-PL" dirty="0" err="1"/>
-              <a:t>Pythona</a:t>
-            </a:r>
-            <a:r>
-              <a:rPr lang="pl-PL" dirty="0"/>
-              <a:t> i R, korzyści ze Scali to  </a:t>
-            </a:r>
-            <a:r>
-              <a:rPr lang="pl-PL" dirty="0" err="1"/>
-              <a:t>statycze</a:t>
-            </a:r>
-            <a:r>
-              <a:rPr lang="pl-PL" dirty="0"/>
-              <a:t> </a:t>
-            </a:r>
-            <a:r>
-              <a:rPr lang="pl-PL" dirty="0" err="1"/>
-              <a:t>typowajie</a:t>
-            </a:r>
-            <a:r>
-              <a:rPr lang="pl-PL" dirty="0"/>
-              <a:t> (</a:t>
-            </a:r>
-            <a:r>
-              <a:rPr lang="en-US" dirty="0"/>
-              <a:t>static typing</a:t>
-            </a:r>
-            <a:r>
-              <a:rPr lang="pl-PL" dirty="0"/>
-              <a:t>) i  </a:t>
-            </a:r>
-            <a:r>
-              <a:rPr lang="en-US" dirty="0"/>
-              <a:t>type inference</a:t>
-            </a:r>
-            <a:r>
-              <a:rPr lang="pl-PL" dirty="0"/>
-              <a:t>.</a:t>
-            </a:r>
-          </a:p>
-          <a:p>
-            <a:r>
-              <a:rPr lang="pl-PL" dirty="0" err="1"/>
-              <a:t>Immutable</a:t>
-            </a:r>
-            <a:r>
-              <a:rPr lang="pl-PL" dirty="0"/>
-              <a:t> data </a:t>
-            </a:r>
-            <a:r>
-              <a:rPr lang="pl-PL" dirty="0" err="1"/>
-              <a:t>striuctrues</a:t>
-            </a:r>
-            <a:r>
-              <a:rPr lang="pl-PL" dirty="0"/>
-              <a:t> - </a:t>
-            </a:r>
-            <a:r>
-              <a:rPr lang="en-US" sz="1200" dirty="0"/>
-              <a:t>allowing for parallel, lock-free data processing,</a:t>
-            </a:r>
-            <a:endParaRPr lang="pl-PL" dirty="0"/>
-          </a:p>
-          <a:p>
-            <a:r>
-              <a:rPr lang="en-US" dirty="0"/>
-              <a:t>Concise, Expressive Code</a:t>
-            </a:r>
-            <a:r>
-              <a:rPr lang="pl-PL" dirty="0"/>
-              <a:t> –  w </a:t>
-            </a:r>
-            <a:r>
-              <a:rPr lang="pl-PL" dirty="0" err="1"/>
-              <a:t>porównianiu</a:t>
-            </a:r>
-            <a:r>
-              <a:rPr lang="pl-PL" dirty="0"/>
-              <a:t> do Javy, kod jest bardziej zwięzły (</a:t>
-            </a:r>
-            <a:r>
-              <a:rPr lang="pl-PL" dirty="0" err="1"/>
-              <a:t>concise</a:t>
-            </a:r>
-            <a:r>
-              <a:rPr lang="pl-PL" dirty="0"/>
-              <a:t>) dzięki czumu zwiększa Twoją produktywność. </a:t>
-            </a:r>
-            <a:r>
-              <a:rPr lang="en-US" dirty="0"/>
-              <a:t>and several features of Scala make your code even more concise. This elevates your productivity and makes it easier to imagine a design approach and then write it down without having to translate the idea to a less flexible API that reflects idiomatic language constraints. (You'll see this in action as we go.)</a:t>
-            </a:r>
-            <a:endParaRPr lang="pl-PL" dirty="0"/>
-          </a:p>
-          <a:p>
-            <a:r>
-              <a:rPr lang="pl-PL" dirty="0"/>
-              <a:t>Debugging – kiedy pojawiają się problemy z kodem, zrozumie </a:t>
-            </a:r>
-            <a:r>
-              <a:rPr lang="pl-PL" dirty="0" err="1"/>
-              <a:t>exception</a:t>
-            </a:r>
-            <a:r>
-              <a:rPr lang="pl-PL" dirty="0"/>
-              <a:t> </a:t>
-            </a:r>
-            <a:r>
-              <a:rPr lang="pl-PL" dirty="0" err="1"/>
-              <a:t>stack</a:t>
-            </a:r>
-            <a:r>
-              <a:rPr lang="pl-PL" dirty="0"/>
-              <a:t> </a:t>
-            </a:r>
-            <a:r>
-              <a:rPr lang="pl-PL" dirty="0" err="1"/>
-              <a:t>trace</a:t>
-            </a:r>
-            <a:r>
-              <a:rPr lang="pl-PL" dirty="0"/>
-              <a:t> jest prostsze jeśli znasz </a:t>
-            </a:r>
-            <a:r>
-              <a:rPr lang="pl-PL" dirty="0" err="1"/>
-              <a:t>Scale</a:t>
-            </a:r>
-            <a:r>
-              <a:rPr lang="pl-PL" dirty="0"/>
-              <a:t>. </a:t>
-            </a:r>
-            <a:r>
-              <a:rPr lang="en-US" dirty="0"/>
-              <a:t>Unfortunately, the "abstraction leaks" when problems occur.</a:t>
-            </a:r>
             <a:endParaRPr lang="pl-PL" dirty="0"/>
           </a:p>
         </p:txBody>
@@ -1049,7 +887,7 @@
     </p:spTree>
     <p:extLst>
       <p:ext uri="{BB962C8B-B14F-4D97-AF65-F5344CB8AC3E}">
-        <p14:creationId xmlns:p14="http://schemas.microsoft.com/office/powerpoint/2010/main" val="3904810144"/>
+        <p14:creationId xmlns:p14="http://schemas.microsoft.com/office/powerpoint/2010/main" val="4043919891"/>
       </p:ext>
     </p:extLst>
   </p:cSld>
@@ -1104,138 +942,199 @@
           <a:lstStyle/>
           <a:p>
             <a:r>
+              <a:rPr lang="en-US" b="1" dirty="0"/>
+              <a:t>Performance</a:t>
+            </a:r>
+            <a:r>
+              <a:rPr lang="pl-PL" dirty="0"/>
+              <a:t> - Spark jest napisany w Scali, dzięki czemu uzyskujemy najlepszą (native) wydajność i największą spójność i pokrycie między API Scali i API Sparka.</a:t>
+            </a:r>
+          </a:p>
+          <a:p>
+            <a:r>
+              <a:rPr lang="en-US" b="1" dirty="0"/>
+              <a:t>Type Safety</a:t>
+            </a:r>
+            <a:r>
+              <a:rPr lang="pl-PL" b="1" dirty="0"/>
+              <a:t> </a:t>
+            </a:r>
+            <a:r>
+              <a:rPr lang="pl-PL" dirty="0"/>
+              <a:t>– w </a:t>
+            </a:r>
+            <a:r>
+              <a:rPr lang="pl-PL" dirty="0" err="1"/>
+              <a:t>prówaniu</a:t>
+            </a:r>
+            <a:r>
+              <a:rPr lang="pl-PL" dirty="0"/>
+              <a:t> do </a:t>
+            </a:r>
+            <a:r>
+              <a:rPr lang="pl-PL" dirty="0" err="1"/>
+              <a:t>Pythona</a:t>
+            </a:r>
+            <a:r>
+              <a:rPr lang="pl-PL" dirty="0"/>
+              <a:t> i R, korzyści ze Scali to </a:t>
+            </a:r>
+            <a:r>
+              <a:rPr lang="pl-PL" dirty="0" err="1"/>
+              <a:t>statycze</a:t>
+            </a:r>
+            <a:r>
+              <a:rPr lang="pl-PL" dirty="0"/>
+              <a:t> typowanie (</a:t>
+            </a:r>
+            <a:r>
               <a:rPr lang="en-US" dirty="0"/>
-              <a:t>Why Not Scala?</a:t>
-            </a:r>
-          </a:p>
-          <a:p>
+              <a:t>static typing</a:t>
+            </a:r>
+            <a:r>
+              <a:rPr lang="pl-PL" dirty="0"/>
+              <a:t>) i  </a:t>
+            </a:r>
             <a:r>
               <a:rPr lang="en-US" dirty="0"/>
-              <a:t>Scala isn't perfect. There are two disadvantages compared to Python and R:</a:t>
-            </a:r>
-          </a:p>
-          <a:p>
-            <a:pPr marL="171450" indent="-171450">
-              <a:buFont typeface="Arial" panose="020B0604020202020204" pitchFamily="34" charset="0"/>
-              <a:buChar char="•"/>
-            </a:pPr>
+              <a:t>type inference</a:t>
+            </a:r>
+            <a:r>
+              <a:rPr lang="pl-PL" dirty="0"/>
+              <a:t> </a:t>
+            </a:r>
+            <a:r>
+              <a:rPr lang="pl-PL" b="0" dirty="0"/>
+              <a:t>(</a:t>
+            </a:r>
+            <a:r>
+              <a:rPr lang="pl-PL" sz="1200" b="0" i="0" kern="1200" dirty="0">
+                <a:solidFill>
+                  <a:schemeClr val="tx1"/>
+                </a:solidFill>
+                <a:effectLst/>
+                <a:latin typeface="+mn-lt"/>
+                <a:ea typeface="+mn-ea"/>
+                <a:cs typeface="+mn-cs"/>
+              </a:rPr>
+              <a:t>wywodzenie typów)</a:t>
+            </a:r>
+            <a:r>
+              <a:rPr lang="pl-PL" dirty="0"/>
+              <a:t>. Wg Martina </a:t>
+            </a:r>
+            <a:r>
+              <a:rPr lang="pl-PL" dirty="0" err="1"/>
+              <a:t>Odersky’ego</a:t>
+            </a:r>
+            <a:r>
+              <a:rPr lang="pl-PL" dirty="0"/>
+              <a:t> większość logicznych błędów w aplikacji napisanych w Sparku wynika z błędnie zdefiniowanych czy tez w powstałych w wyniku transformacji błędów.  Statycznie typowanie kolekcji w Scali bardzo w tym pomaga.</a:t>
+            </a:r>
+          </a:p>
+          <a:p>
+            <a:r>
+              <a:rPr lang="pl-PL" b="1" dirty="0" err="1"/>
+              <a:t>Immutable</a:t>
+            </a:r>
+            <a:r>
+              <a:rPr lang="pl-PL" b="1" dirty="0"/>
+              <a:t> data </a:t>
+            </a:r>
+            <a:r>
+              <a:rPr lang="pl-PL" b="1" dirty="0" err="1"/>
+              <a:t>structrues</a:t>
+            </a:r>
+            <a:r>
+              <a:rPr lang="pl-PL" dirty="0"/>
+              <a:t> - </a:t>
+            </a:r>
+            <a:r>
+              <a:rPr lang="en-US" sz="1200" dirty="0"/>
+              <a:t>allowing for parallel, lock-free data processing,</a:t>
+            </a:r>
+            <a:endParaRPr lang="pl-PL" dirty="0"/>
+          </a:p>
+          <a:p>
+            <a:r>
+              <a:rPr lang="en-US" b="1" dirty="0"/>
+              <a:t>Concise, Expressive Code</a:t>
+            </a:r>
+            <a:r>
+              <a:rPr lang="pl-PL" b="1" dirty="0"/>
+              <a:t> </a:t>
+            </a:r>
+            <a:r>
+              <a:rPr lang="pl-PL" dirty="0"/>
+              <a:t>–  w porównaniu do Javy, kod jest bardziej zwięzły (</a:t>
+            </a:r>
+            <a:r>
+              <a:rPr lang="pl-PL" dirty="0" err="1"/>
+              <a:t>concise</a:t>
+            </a:r>
+            <a:r>
+              <a:rPr lang="pl-PL" dirty="0"/>
+              <a:t>) dzięki czumu zwiększa Twoją produktywność. </a:t>
+            </a:r>
             <a:r>
               <a:rPr lang="en-US" dirty="0"/>
-              <a:t>Libraries</a:t>
-            </a:r>
-            <a:r>
-              <a:rPr lang="pl-PL" dirty="0"/>
-              <a:t> - </a:t>
+              <a:t>and several features of Scala make your code even more concise. This elevates your productivity and makes it easier to imagine a design approach and then write it down without having to translate the idea to a less flexible API that reflects idiomatic language constraints. (You'll see this in action as we go.)</a:t>
+            </a:r>
+            <a:endParaRPr lang="pl-PL" dirty="0"/>
+          </a:p>
+          <a:p>
+            <a:r>
+              <a:rPr lang="pl-PL" b="1" dirty="0"/>
+              <a:t>Debugging</a:t>
+            </a:r>
+            <a:r>
+              <a:rPr lang="pl-PL" dirty="0"/>
+              <a:t> – kiedy pojawiają się problemy z kodem, zrozumie </a:t>
+            </a:r>
+            <a:r>
+              <a:rPr lang="pl-PL" dirty="0" err="1"/>
+              <a:t>exception</a:t>
+            </a:r>
+            <a:r>
+              <a:rPr lang="pl-PL" dirty="0"/>
+              <a:t> </a:t>
+            </a:r>
+            <a:r>
+              <a:rPr lang="pl-PL" dirty="0" err="1"/>
+              <a:t>stack</a:t>
+            </a:r>
+            <a:r>
+              <a:rPr lang="pl-PL" dirty="0"/>
+              <a:t> </a:t>
+            </a:r>
+            <a:r>
+              <a:rPr lang="pl-PL" dirty="0" err="1"/>
+              <a:t>trace</a:t>
+            </a:r>
+            <a:r>
+              <a:rPr lang="pl-PL" dirty="0"/>
+              <a:t> jest prostsze jeśli znasz </a:t>
+            </a:r>
+            <a:r>
+              <a:rPr lang="pl-PL" dirty="0" err="1"/>
+              <a:t>Scale</a:t>
+            </a:r>
+            <a:r>
+              <a:rPr lang="pl-PL" dirty="0"/>
+              <a:t>. </a:t>
             </a:r>
             <a:r>
               <a:rPr lang="en-US" dirty="0"/>
-              <a:t>Python </a:t>
-            </a:r>
-            <a:r>
-              <a:rPr lang="pl-PL" dirty="0"/>
-              <a:t>i</a:t>
-            </a:r>
-            <a:r>
-              <a:rPr lang="en-US" dirty="0"/>
-              <a:t> R </a:t>
-            </a:r>
-            <a:r>
-              <a:rPr lang="pl-PL" dirty="0"/>
-              <a:t> posiada bogaty </a:t>
-            </a:r>
-            <a:r>
-              <a:rPr lang="pl-PL" dirty="0" err="1"/>
-              <a:t>echosytem</a:t>
-            </a:r>
-            <a:r>
-              <a:rPr lang="pl-PL" dirty="0"/>
-              <a:t> bibliotek i duże </a:t>
-            </a:r>
-            <a:r>
-              <a:rPr lang="pl-PL" dirty="0" err="1"/>
-              <a:t>community</a:t>
-            </a:r>
-            <a:r>
-              <a:rPr lang="pl-PL" dirty="0"/>
-              <a:t>. Scala stara się gonić </a:t>
-            </a:r>
-            <a:r>
-              <a:rPr lang="pl-PL" dirty="0" err="1"/>
-              <a:t>Pythona</a:t>
-            </a:r>
-            <a:r>
-              <a:rPr lang="pl-PL" dirty="0"/>
-              <a:t>, ale to jak z analogią psa i uciekającego </a:t>
-            </a:r>
-            <a:r>
-              <a:rPr lang="pl-PL" dirty="0" err="1"/>
-              <a:t>któlika</a:t>
-            </a:r>
-            <a:r>
-              <a:rPr lang="pl-PL" dirty="0"/>
-              <a:t>. </a:t>
-            </a:r>
-          </a:p>
-          <a:p>
-            <a:pPr marL="171450" indent="-171450">
-              <a:buFont typeface="Arial" panose="020B0604020202020204" pitchFamily="34" charset="0"/>
-              <a:buChar char="•"/>
-            </a:pPr>
-            <a:r>
-              <a:rPr lang="en-US" dirty="0"/>
-              <a:t>Advanced Language Features:</a:t>
-            </a:r>
-            <a:r>
-              <a:rPr lang="pl-PL" dirty="0"/>
-              <a:t> - opanowanie API Scali to nie </a:t>
-            </a:r>
-            <a:r>
-              <a:rPr lang="pl-PL" dirty="0" err="1"/>
-              <a:t>laday</a:t>
-            </a:r>
-            <a:r>
-              <a:rPr lang="pl-PL" dirty="0"/>
-              <a:t> wyczyn. Jeśli jednak nie rozumiesz jak działa bardziej wyszukane konstrukcje jak </a:t>
-            </a:r>
-            <a:r>
-              <a:rPr lang="pl-PL" dirty="0" err="1"/>
-              <a:t>patter</a:t>
-            </a:r>
-            <a:r>
-              <a:rPr lang="pl-PL" dirty="0"/>
-              <a:t> </a:t>
-            </a:r>
-            <a:r>
-              <a:rPr lang="pl-PL" dirty="0" err="1"/>
-              <a:t>matching</a:t>
-            </a:r>
-            <a:r>
-              <a:rPr lang="pl-PL" dirty="0"/>
-              <a:t>, </a:t>
-            </a:r>
-            <a:r>
-              <a:rPr lang="pl-PL" dirty="0" err="1"/>
-              <a:t>implicits</a:t>
-            </a:r>
-            <a:r>
-              <a:rPr lang="pl-PL" dirty="0"/>
-              <a:t>, można się </a:t>
-            </a:r>
-            <a:r>
-              <a:rPr lang="pl-PL" dirty="0" err="1"/>
-              <a:t>zfrsutrować</a:t>
-            </a:r>
-            <a:r>
-              <a:rPr lang="pl-PL" dirty="0"/>
-              <a:t>. Całe szczęście Spark ukrywa większość zaawansowanych konstrukcji Scali przed nami.</a:t>
-            </a:r>
+              <a:t>Unfortunately, the "abstraction leaks" when problems occur.</a:t>
+            </a:r>
+            <a:endParaRPr lang="pl-PL" dirty="0"/>
           </a:p>
         </p:txBody>
       </p:sp>
     </p:spTree>
     <p:extLst>
       <p:ext uri="{BB962C8B-B14F-4D97-AF65-F5344CB8AC3E}">
-        <p14:creationId xmlns:p14="http://schemas.microsoft.com/office/powerpoint/2010/main" val="1147915891"/>
+        <p14:creationId xmlns:p14="http://schemas.microsoft.com/office/powerpoint/2010/main" val="3904810144"/>
       </p:ext>
     </p:extLst>
   </p:cSld>
@@ -1289,14 +1188,143 @@
           <a:bodyPr/>
           <a:lstStyle/>
           <a:p>
-            <a:endParaRPr lang="pl-PL" dirty="0"/>
+            <a:r>
+              <a:rPr lang="en-US" dirty="0"/>
+              <a:t>Why Not Scala?</a:t>
+            </a:r>
+          </a:p>
+          <a:p>
+            <a:r>
+              <a:rPr lang="en-US" dirty="0"/>
+              <a:t>Scala </a:t>
+            </a:r>
+            <a:r>
+              <a:rPr lang="pl-PL" dirty="0"/>
+              <a:t>nie jest doskonała, jak każdy język. Są dwie główne wady w porównaniu do </a:t>
+            </a:r>
+            <a:r>
+              <a:rPr lang="en-US" dirty="0"/>
+              <a:t>Python</a:t>
+            </a:r>
+            <a:r>
+              <a:rPr lang="pl-PL" dirty="0"/>
+              <a:t>a czy</a:t>
+            </a:r>
+            <a:r>
+              <a:rPr lang="en-US" dirty="0"/>
+              <a:t> R:</a:t>
+            </a:r>
+          </a:p>
+          <a:p>
+            <a:pPr marL="171450" indent="-171450">
+              <a:buFont typeface="Arial" panose="020B0604020202020204" pitchFamily="34" charset="0"/>
+              <a:buChar char="•"/>
+            </a:pPr>
+            <a:r>
+              <a:rPr lang="en-US" b="1" dirty="0"/>
+              <a:t>Libraries</a:t>
+            </a:r>
+            <a:r>
+              <a:rPr lang="pl-PL" dirty="0"/>
+              <a:t> - </a:t>
+            </a:r>
+            <a:r>
+              <a:rPr lang="en-US" dirty="0"/>
+              <a:t>Python </a:t>
+            </a:r>
+            <a:r>
+              <a:rPr lang="pl-PL" dirty="0"/>
+              <a:t>i</a:t>
+            </a:r>
+            <a:r>
+              <a:rPr lang="en-US" dirty="0"/>
+              <a:t> R </a:t>
+            </a:r>
+            <a:r>
+              <a:rPr lang="pl-PL" dirty="0"/>
+              <a:t> posiada bogaty </a:t>
+            </a:r>
+            <a:r>
+              <a:rPr lang="pl-PL" dirty="0" err="1"/>
+              <a:t>echosytem</a:t>
+            </a:r>
+            <a:r>
+              <a:rPr lang="pl-PL" dirty="0"/>
+              <a:t> bibliotek i duże </a:t>
+            </a:r>
+            <a:r>
+              <a:rPr lang="pl-PL" dirty="0" err="1"/>
+              <a:t>community</a:t>
+            </a:r>
+            <a:r>
+              <a:rPr lang="pl-PL" dirty="0"/>
+              <a:t>. Scala stara się gonić </a:t>
+            </a:r>
+            <a:r>
+              <a:rPr lang="pl-PL" dirty="0" err="1"/>
+              <a:t>Pythona</a:t>
+            </a:r>
+            <a:r>
+              <a:rPr lang="pl-PL" dirty="0"/>
+              <a:t>, ale to jak z analogią do „psa i uciekającego królika”. </a:t>
+            </a:r>
+          </a:p>
+          <a:p>
+            <a:pPr marL="171450" indent="-171450">
+              <a:buFont typeface="Arial" panose="020B0604020202020204" pitchFamily="34" charset="0"/>
+              <a:buChar char="•"/>
+            </a:pPr>
+            <a:r>
+              <a:rPr lang="en-US" b="1" dirty="0"/>
+              <a:t>Advanced Language Features:</a:t>
+            </a:r>
+            <a:r>
+              <a:rPr lang="pl-PL" b="1" dirty="0"/>
+              <a:t> </a:t>
+            </a:r>
+            <a:r>
+              <a:rPr lang="pl-PL" dirty="0"/>
+              <a:t>- opanowanie API Scali to nie lada wyczyn. Jeśli nie rozumiesz jak działa bardziej wyszukane konstrukcje jak </a:t>
+            </a:r>
+            <a:r>
+              <a:rPr lang="pl-PL" dirty="0" err="1"/>
+              <a:t>patter</a:t>
+            </a:r>
+            <a:r>
+              <a:rPr lang="pl-PL" dirty="0"/>
+              <a:t> </a:t>
+            </a:r>
+            <a:r>
+              <a:rPr lang="pl-PL" dirty="0" err="1"/>
+              <a:t>matching</a:t>
+            </a:r>
+            <a:r>
+              <a:rPr lang="pl-PL" dirty="0"/>
+              <a:t>, </a:t>
+            </a:r>
+            <a:r>
+              <a:rPr lang="pl-PL" dirty="0" err="1"/>
+              <a:t>implicits</a:t>
+            </a:r>
+            <a:r>
+              <a:rPr lang="pl-PL" dirty="0"/>
+              <a:t>, </a:t>
+            </a:r>
+            <a:r>
+              <a:rPr lang="pl-PL" dirty="0" err="1"/>
+              <a:t>lineralization</a:t>
+            </a:r>
+            <a:r>
+              <a:rPr lang="pl-PL" dirty="0"/>
+              <a:t> można się sfrustrować. Całe szczęście Spark ukrywa większość zaawansowanych konstrukcji Scali przed nami.</a:t>
+            </a:r>
           </a:p>
         </p:txBody>
       </p:sp>
     </p:spTree>
     <p:extLst>
       <p:ext uri="{BB962C8B-B14F-4D97-AF65-F5344CB8AC3E}">
-        <p14:creationId xmlns:p14="http://schemas.microsoft.com/office/powerpoint/2010/main" val="730357486"/>
+        <p14:creationId xmlns:p14="http://schemas.microsoft.com/office/powerpoint/2010/main" val="1147915891"/>
       </p:ext>
     </p:extLst>
   </p:cSld>
@@ -1350,14 +1378,75 @@
           <a:bodyPr/>
           <a:lstStyle/>
           <a:p>
-            <a:endParaRPr lang="pl-PL" dirty="0"/>
+            <a:r>
+              <a:rPr lang="pl-PL" b="1" dirty="0" err="1"/>
+              <a:t>Tuples</a:t>
+            </a:r>
+            <a:r>
+              <a:rPr lang="pl-PL" dirty="0"/>
+              <a:t> – podobno do kolekcji </a:t>
+            </a:r>
+            <a:r>
+              <a:rPr lang="pl-PL" dirty="0" err="1"/>
+              <a:t>niemutowalne</a:t>
+            </a:r>
+            <a:r>
+              <a:rPr lang="pl-PL" dirty="0"/>
+              <a:t> (</a:t>
+            </a:r>
+            <a:r>
+              <a:rPr lang="pl-PL" dirty="0" err="1"/>
+              <a:t>immutable</a:t>
+            </a:r>
+            <a:r>
+              <a:rPr lang="pl-PL" dirty="0"/>
+              <a:t>), ale w odróżnieniu od kolekcji mogą posiadać różne typy danych. Bardzo przydatne, np. jak chcesz zwrócić wiele obiektów z metody.</a:t>
+            </a:r>
+          </a:p>
+          <a:p>
+            <a:r>
+              <a:rPr lang="pl-PL" dirty="0"/>
+              <a:t>Po zdefiniowaniu, mamy dostęp do </a:t>
+            </a:r>
+            <a:r>
+              <a:rPr lang="pl-PL" dirty="0" err="1"/>
+              <a:t>elemtów</a:t>
+            </a:r>
+            <a:r>
+              <a:rPr lang="pl-PL" dirty="0"/>
+              <a:t> =&gt; kropka, </a:t>
+            </a:r>
+            <a:r>
+              <a:rPr lang="pl-PL" dirty="0" err="1"/>
+              <a:t>podkreślnik</a:t>
+            </a:r>
+            <a:r>
+              <a:rPr lang="pl-PL" dirty="0"/>
+              <a:t> oraz „one-</a:t>
+            </a:r>
+            <a:r>
+              <a:rPr lang="pl-PL" dirty="0" err="1"/>
+              <a:t>based</a:t>
+            </a:r>
+            <a:r>
+              <a:rPr lang="pl-PL" dirty="0"/>
+              <a:t> index” (tradycja z </a:t>
+            </a:r>
+            <a:r>
+              <a:rPr lang="pl-PL" dirty="0" err="1"/>
+              <a:t>Haskella</a:t>
+            </a:r>
+            <a:r>
+              <a:rPr lang="pl-PL" dirty="0"/>
+              <a:t>).</a:t>
+            </a:r>
           </a:p>
         </p:txBody>
       </p:sp>
     </p:spTree>
     <p:extLst>
       <p:ext uri="{BB962C8B-B14F-4D97-AF65-F5344CB8AC3E}">
-        <p14:creationId xmlns:p14="http://schemas.microsoft.com/office/powerpoint/2010/main" val="3267287691"/>
+        <p14:creationId xmlns:p14="http://schemas.microsoft.com/office/powerpoint/2010/main" val="730357486"/>
       </p:ext>
     </p:extLst>
   </p:cSld>
@@ -1412,182 +1501,29 @@
           <a:lstStyle/>
           <a:p>
             <a:r>
-              <a:rPr lang="pl-PL" dirty="0"/>
-              <a:t>First </a:t>
-            </a:r>
-            <a:r>
-              <a:rPr lang="pl-PL" dirty="0" err="1"/>
-              <a:t>class</a:t>
-            </a:r>
-            <a:r>
-              <a:rPr lang="pl-PL" dirty="0"/>
+              <a:rPr lang="en-US" sz="1200" b="0" i="0" u="none" strike="noStrike" kern="1200" baseline="0" dirty="0">
+                <a:solidFill>
+                  <a:schemeClr val="tx1"/>
+                </a:solidFill>
+                <a:latin typeface="+mn-lt"/>
+                <a:ea typeface="+mn-ea"/>
+                <a:cs typeface="+mn-cs"/>
+              </a:rPr>
+              <a:t>Case classes are Scala’s way to allow pattern matching on objects without</a:t>
+            </a:r>
+            <a:r>
+              <a:rPr lang="pl-PL" sz="1200" b="0" i="0" u="none" strike="noStrike" kern="1200" baseline="0" dirty="0">
+                <a:solidFill>
+                  <a:schemeClr val="tx1"/>
+                </a:solidFill>
+                <a:latin typeface="+mn-lt"/>
+                <a:ea typeface="+mn-ea"/>
+                <a:cs typeface="+mn-cs"/>
+              </a:rPr>
               <a:t> </a:t>
             </a:r>
             <a:r>
-              <a:rPr lang="pl-PL" dirty="0" err="1"/>
-              <a:t>citizien</a:t>
-            </a:r>
-            <a:r>
-              <a:rPr lang="pl-PL" dirty="0"/>
-              <a:t> – </a:t>
-            </a:r>
-            <a:r>
-              <a:rPr lang="pl-PL" dirty="0" err="1"/>
-              <a:t>sa</a:t>
-            </a:r>
-            <a:r>
-              <a:rPr lang="pl-PL" dirty="0"/>
-              <a:t> wszechobecne, nie są tylko </a:t>
-            </a:r>
-            <a:r>
-              <a:rPr lang="pl-PL" dirty="0" err="1"/>
-              <a:t>delarowane</a:t>
-            </a:r>
-            <a:r>
-              <a:rPr lang="pl-PL" dirty="0"/>
-              <a:t> i wykonywane ale mogą być </a:t>
-            </a:r>
-            <a:r>
-              <a:rPr lang="pl-PL" dirty="0" err="1"/>
-              <a:t>uzyte</a:t>
-            </a:r>
-            <a:r>
-              <a:rPr lang="pl-PL" dirty="0"/>
-              <a:t> jako po </a:t>
-            </a:r>
-            <a:r>
-              <a:rPr lang="pl-PL" dirty="0" err="1"/>
-              <a:t>prstu</a:t>
-            </a:r>
-            <a:r>
-              <a:rPr lang="pl-PL" dirty="0"/>
-              <a:t> typ danych.</a:t>
-            </a:r>
-          </a:p>
-          <a:p>
-            <a:r>
-              <a:rPr lang="pl-PL" dirty="0"/>
-              <a:t>Mogą wiec być </a:t>
-            </a:r>
-            <a:r>
-              <a:rPr lang="pl-PL" dirty="0" err="1"/>
-              <a:t>zdefinowane</a:t>
-            </a:r>
-            <a:r>
-              <a:rPr lang="pl-PL" dirty="0"/>
-              <a:t> jako literał, jako literał bez nazwy (czyli to co znamy z </a:t>
-            </a:r>
-            <a:r>
-              <a:rPr lang="pl-PL" dirty="0" err="1"/>
-              <a:t>javy</a:t>
-            </a:r>
-            <a:r>
-              <a:rPr lang="pl-PL" dirty="0"/>
-              <a:t> </a:t>
-            </a:r>
-            <a:r>
-              <a:rPr lang="pl-PL" dirty="0" err="1"/>
-              <a:t>javascirpt</a:t>
-            </a:r>
-            <a:r>
-              <a:rPr lang="pl-PL" dirty="0"/>
-              <a:t> jako </a:t>
-            </a:r>
-            <a:r>
-              <a:rPr lang="pl-PL" dirty="0" err="1"/>
-              <a:t>lampda</a:t>
-            </a:r>
-            <a:r>
-              <a:rPr lang="pl-PL" dirty="0"/>
-              <a:t>, bądź anonimowa funkcja), mogą być zapisane jako </a:t>
-            </a:r>
-            <a:r>
-              <a:rPr lang="pl-PL" dirty="0" err="1"/>
-              <a:t>value</a:t>
-            </a:r>
-            <a:r>
-              <a:rPr lang="pl-PL" dirty="0"/>
-              <a:t> bądź </a:t>
-            </a:r>
-            <a:r>
-              <a:rPr lang="pl-PL" dirty="0" err="1"/>
-              <a:t>variable</a:t>
-            </a:r>
-            <a:r>
-              <a:rPr lang="pl-PL" dirty="0"/>
-              <a:t> oraz </a:t>
-            </a:r>
-            <a:r>
-              <a:rPr lang="pl-PL" dirty="0" err="1"/>
-              <a:t>uzyte</a:t>
-            </a:r>
-            <a:r>
-              <a:rPr lang="pl-PL" dirty="0"/>
-              <a:t> jako </a:t>
-            </a:r>
-            <a:r>
-              <a:rPr lang="pl-PL" dirty="0" err="1"/>
-              <a:t>paramter</a:t>
-            </a:r>
-            <a:r>
-              <a:rPr lang="pl-PL" dirty="0"/>
-              <a:t> do innej funkcji bądź nawet zwrócone z innej funkcji.</a:t>
-            </a:r>
-          </a:p>
-          <a:p>
-            <a:r>
-              <a:rPr lang="pl-PL" dirty="0" err="1"/>
-              <a:t>Pure</a:t>
-            </a:r>
-            <a:r>
-              <a:rPr lang="pl-PL" dirty="0"/>
-              <a:t> </a:t>
-            </a:r>
-            <a:r>
-              <a:rPr lang="pl-PL" dirty="0" err="1"/>
-              <a:t>functions</a:t>
-            </a:r>
-            <a:r>
-              <a:rPr lang="pl-PL" dirty="0"/>
-              <a:t> – nie maja </a:t>
-            </a:r>
-            <a:r>
-              <a:rPr lang="pl-PL" dirty="0" err="1"/>
-              <a:t>side</a:t>
-            </a:r>
-            <a:r>
-              <a:rPr lang="pl-PL" dirty="0"/>
-              <a:t> </a:t>
-            </a:r>
-            <a:r>
-              <a:rPr lang="pl-PL" dirty="0" err="1"/>
-              <a:t>effectów</a:t>
-            </a:r>
-            <a:r>
-              <a:rPr lang="pl-PL" dirty="0"/>
-              <a:t>, czyli nie modyfikują stanu, są </a:t>
-            </a:r>
-            <a:r>
-              <a:rPr lang="pl-PL" dirty="0" err="1"/>
-              <a:t>stateless</a:t>
-            </a:r>
-            <a:endParaRPr lang="pl-PL" dirty="0"/>
-          </a:p>
-          <a:p>
-            <a:r>
-              <a:rPr lang="pl-PL" dirty="0"/>
-              <a:t>High-order </a:t>
-            </a:r>
-            <a:r>
-              <a:rPr lang="pl-PL" dirty="0" err="1"/>
-              <a:t>funcions</a:t>
-            </a:r>
-            <a:r>
-              <a:rPr lang="pl-PL" dirty="0"/>
-              <a:t> – przyjmują w argumencie inna funkcje bądź zwracają funkcje. Najbardziej znane to </a:t>
-            </a:r>
-            <a:r>
-              <a:rPr lang="pl-PL" sz="1200" b="0" i="0" u="none" strike="noStrike" kern="1200" baseline="0" dirty="0">
+              <a:rPr lang="en-US" sz="1200" b="0" i="0" u="none" strike="noStrike" kern="1200" baseline="0" dirty="0">
                 <a:solidFill>
                   <a:schemeClr val="tx1"/>
                 </a:solidFill>
@@ -1595,32 +1531,8 @@
                 <a:ea typeface="+mn-ea"/>
                 <a:cs typeface="+mn-cs"/>
               </a:rPr>
-              <a:t>map() i </a:t>
-            </a:r>
-            <a:r>
-              <a:rPr lang="pl-PL" sz="1200" b="0" i="0" u="none" strike="noStrike" kern="1200" baseline="0" dirty="0" err="1">
-                <a:solidFill>
-                  <a:schemeClr val="tx1"/>
-                </a:solidFill>
-                <a:latin typeface="+mn-lt"/>
-                <a:ea typeface="+mn-ea"/>
-                <a:cs typeface="+mn-cs"/>
-              </a:rPr>
-              <a:t>reduce</a:t>
-            </a:r>
-            <a:r>
-              <a:rPr lang="pl-PL" sz="1200" b="0" i="0" u="none" strike="noStrike" kern="1200" baseline="0" dirty="0">
-                <a:solidFill>
-                  <a:schemeClr val="tx1"/>
-                </a:solidFill>
-                <a:latin typeface="+mn-lt"/>
-                <a:ea typeface="+mn-ea"/>
-                <a:cs typeface="+mn-cs"/>
-              </a:rPr>
-              <a:t>().</a:t>
-            </a:r>
-          </a:p>
-          <a:p>
+              <a:t>requiring a large amount of boilerplate. </a:t>
+            </a:r>
             <a:endParaRPr lang="pl-PL" sz="1200" b="0" i="0" u="none" strike="noStrike" kern="1200" baseline="0" dirty="0">
               <a:solidFill>
                 <a:schemeClr val="tx1"/>
@@ -1632,7 +1544,7 @@
           </a:p>
           <a:p>
             <a:r>
-              <a:rPr lang="pl-PL" sz="1200" b="0" i="0" u="none" strike="noStrike" kern="1200" baseline="0" dirty="0">
+              <a:rPr lang="en-US" sz="1200" b="0" i="0" u="none" strike="noStrike" kern="1200" baseline="0" dirty="0">
                 <a:solidFill>
                   <a:schemeClr val="tx1"/>
                 </a:solidFill>
@@ -1640,40 +1552,7 @@
                 <a:ea typeface="+mn-ea"/>
                 <a:cs typeface="+mn-cs"/>
               </a:rPr>
-              <a:t>The map() </a:t>
-            </a:r>
-            <a:r>
-              <a:rPr lang="pl-PL" sz="1200" b="0" i="0" u="none" strike="noStrike" kern="1200" baseline="0" dirty="0" err="1">
-                <a:solidFill>
-                  <a:schemeClr val="tx1"/>
-                </a:solidFill>
-                <a:latin typeface="+mn-lt"/>
-                <a:ea typeface="+mn-ea"/>
-                <a:cs typeface="+mn-cs"/>
-              </a:rPr>
-              <a:t>higher</a:t>
-            </a:r>
-            <a:r>
-              <a:rPr lang="pl-PL" sz="1200" b="0" i="0" u="none" strike="noStrike" kern="1200" baseline="0" dirty="0">
-                <a:solidFill>
-                  <a:schemeClr val="tx1"/>
-                </a:solidFill>
-                <a:latin typeface="+mn-lt"/>
-                <a:ea typeface="+mn-ea"/>
-                <a:cs typeface="+mn-cs"/>
-              </a:rPr>
-              <a:t>-order </a:t>
-            </a:r>
-            <a:r>
-              <a:rPr lang="pl-PL" sz="1200" b="0" i="0" u="none" strike="noStrike" kern="1200" baseline="0" dirty="0" err="1">
-                <a:solidFill>
-                  <a:schemeClr val="tx1"/>
-                </a:solidFill>
-                <a:latin typeface="+mn-lt"/>
-                <a:ea typeface="+mn-ea"/>
-                <a:cs typeface="+mn-cs"/>
-              </a:rPr>
-              <a:t>function</a:t>
+              <a:t>Generally, all you need to do is add</a:t>
             </a:r>
             <a:r>
               <a:rPr lang="pl-PL" sz="1200" b="0" i="0" u="none" strike="noStrike" kern="1200" baseline="0" dirty="0">
@@ -1695,10 +1574,19 @@
                 <a:ea typeface="+mn-ea"/>
                 <a:cs typeface="+mn-cs"/>
               </a:rPr>
-              <a:t>takes a function parameter and uses it to convert one or more items to a new value</a:t>
-            </a:r>
-          </a:p>
-          <a:p>
+              <a:t>a single case keyword to each class that you want to be pattern </a:t>
+            </a:r>
+            <a:r>
+              <a:rPr lang="en-US" sz="1200" b="0" i="0" u="none" strike="noStrike" kern="1200" baseline="0" dirty="0" err="1">
+                <a:solidFill>
+                  <a:schemeClr val="tx1"/>
+                </a:solidFill>
+                <a:latin typeface="+mn-lt"/>
+                <a:ea typeface="+mn-ea"/>
+                <a:cs typeface="+mn-cs"/>
+              </a:rPr>
+              <a:t>matchable</a:t>
+            </a:r>
             <a:r>
               <a:rPr lang="en-US" sz="1200" b="0" i="0" u="none" strike="noStrike" kern="1200" baseline="0" dirty="0">
                 <a:solidFill>
@@ -1708,7 +1596,7 @@
                 <a:ea typeface="+mn-ea"/>
                 <a:cs typeface="+mn-cs"/>
               </a:rPr>
-              <a:t>and/or type. </a:t>
+              <a:t>.</a:t>
             </a:r>
             <a:endParaRPr lang="pl-PL" sz="1200" b="0" i="0" u="none" strike="noStrike" kern="1200" baseline="0" dirty="0">
               <a:solidFill>
@@ -1720,39 +1608,6 @@
             </a:endParaRPr>
           </a:p>
           <a:p>
-            <a:r>
-              <a:rPr lang="en-US" sz="1200" b="0" i="0" u="none" strike="noStrike" kern="1200" baseline="0" dirty="0">
-                <a:solidFill>
-                  <a:schemeClr val="tx1"/>
-                </a:solidFill>
-                <a:latin typeface="+mn-lt"/>
-                <a:ea typeface="+mn-ea"/>
-                <a:cs typeface="+mn-cs"/>
-              </a:rPr>
-              <a:t>The reduce() higher-order function takes a function parameter and uses</a:t>
-            </a:r>
-            <a:r>
-              <a:rPr lang="pl-PL" sz="1200" b="0" i="0" u="none" strike="noStrike" kern="1200" baseline="0" dirty="0">
-                <a:solidFill>
-                  <a:schemeClr val="tx1"/>
-                </a:solidFill>
-                <a:latin typeface="+mn-lt"/>
-                <a:ea typeface="+mn-ea"/>
-                <a:cs typeface="+mn-cs"/>
-              </a:rPr>
-              <a:t> </a:t>
-            </a:r>
-            <a:r>
-              <a:rPr lang="en-US" sz="1200" b="0" i="0" u="none" strike="noStrike" kern="1200" baseline="0" dirty="0">
-                <a:solidFill>
-                  <a:schemeClr val="tx1"/>
-                </a:solidFill>
-                <a:latin typeface="+mn-lt"/>
-                <a:ea typeface="+mn-ea"/>
-                <a:cs typeface="+mn-cs"/>
-              </a:rPr>
-              <a:t>it to reduce a collection of multiple items down to a single item.</a:t>
-            </a:r>
             <a:endParaRPr lang="pl-PL" sz="1200" b="0" i="0" u="none" strike="noStrike" kern="1200" baseline="0" dirty="0">
               <a:solidFill>
                 <a:schemeClr val="tx1"/>
@@ -1763,45 +1618,24 @@
             </a:endParaRPr>
           </a:p>
           <a:p>
-            <a:endParaRPr lang="pl-PL" sz="1200" b="0" i="0" u="none" strike="noStrike" kern="1200" baseline="0" dirty="0">
-              <a:solidFill>
-                <a:schemeClr val="tx1"/>
-              </a:solidFill>
-              <a:latin typeface="+mn-lt"/>
-              <a:ea typeface="+mn-ea"/>
-              <a:cs typeface="+mn-cs"/>
-            </a:endParaRPr>
-          </a:p>
-          <a:p>
-            <a:r>
-              <a:rPr lang="en-US" sz="1200" b="0" i="0" u="none" strike="noStrike" kern="1200" baseline="0" dirty="0">
-                <a:solidFill>
-                  <a:schemeClr val="tx1"/>
-                </a:solidFill>
+            <a:r>
+              <a:rPr lang="pl-PL" sz="1200" b="1" kern="1200" dirty="0" err="1">
+                <a:solidFill>
+                  <a:schemeClr val="tx1"/>
+                </a:solidFill>
+                <a:effectLst/>
                 <a:latin typeface="+mn-lt"/>
                 <a:ea typeface="+mn-ea"/>
                 <a:cs typeface="+mn-cs"/>
               </a:rPr>
-              <a:t>The popular Map/Reduce computing paradigm uses this concept to tackle large computing challenges, by</a:t>
-            </a:r>
-          </a:p>
-          <a:p>
-            <a:r>
-              <a:rPr lang="en-US" sz="1200" b="0" i="0" u="none" strike="noStrike" kern="1200" baseline="0" dirty="0">
-                <a:solidFill>
-                  <a:schemeClr val="tx1"/>
-                </a:solidFill>
-                <a:latin typeface="+mn-lt"/>
-                <a:ea typeface="+mn-ea"/>
-                <a:cs typeface="+mn-cs"/>
-              </a:rPr>
-              <a:t>mapping the computation across a range of distributed nodes and reducing their results</a:t>
-            </a:r>
-            <a:r>
-              <a:rPr lang="pl-PL" sz="1200" b="0" i="0" u="none" strike="noStrike" kern="1200" baseline="0" dirty="0">
-                <a:solidFill>
-                  <a:schemeClr val="tx1"/>
-                </a:solidFill>
+              <a:t>object</a:t>
+            </a:r>
+            <a:r>
+              <a:rPr lang="pl-PL" sz="1200" b="1" kern="1200" dirty="0">
+                <a:solidFill>
+                  <a:schemeClr val="tx1"/>
+                </a:solidFill>
+                <a:effectLst/>
                 <a:latin typeface="+mn-lt"/>
                 <a:ea typeface="+mn-ea"/>
                 <a:cs typeface="+mn-cs"/>
@@ -1809,16 +1643,803 @@
               <a:t> </a:t>
             </a:r>
             <a:r>
-              <a:rPr lang="en-US" sz="1200" b="0" i="0" u="none" strike="noStrike" kern="1200" baseline="0" dirty="0">
-                <a:solidFill>
-                  <a:schemeClr val="tx1"/>
-                </a:solidFill>
+              <a:rPr lang="pl-PL" dirty="0" err="1"/>
+              <a:t>CaseClasses</a:t>
+            </a:r>
+            <a:r>
+              <a:rPr lang="pl-PL" dirty="0"/>
+              <a:t> </a:t>
+            </a:r>
+            <a:r>
+              <a:rPr lang="pl-PL" sz="1200" b="1" kern="1200" dirty="0" err="1">
+                <a:solidFill>
+                  <a:schemeClr val="tx1"/>
+                </a:solidFill>
+                <a:effectLst/>
                 <a:latin typeface="+mn-lt"/>
                 <a:ea typeface="+mn-ea"/>
                 <a:cs typeface="+mn-cs"/>
               </a:rPr>
-              <a:t>back to a meaningful size.</a:t>
-            </a:r>
+              <a:t>extends</a:t>
+            </a:r>
+            <a:r>
+              <a:rPr lang="pl-PL" sz="1200" b="1" kern="1200" dirty="0">
+                <a:solidFill>
+                  <a:schemeClr val="tx1"/>
+                </a:solidFill>
+                <a:effectLst/>
+                <a:latin typeface="+mn-lt"/>
+                <a:ea typeface="+mn-ea"/>
+                <a:cs typeface="+mn-cs"/>
+              </a:rPr>
+              <a:t> </a:t>
+            </a:r>
+            <a:r>
+              <a:rPr lang="pl-PL" dirty="0" err="1"/>
+              <a:t>App</a:t>
+            </a:r>
+            <a:r>
+              <a:rPr lang="pl-PL" dirty="0"/>
+              <a:t> {</a:t>
+            </a:r>
+            <a:br>
+              <a:rPr lang="pl-PL" dirty="0"/>
+            </a:br>
+            <a:br>
+              <a:rPr lang="pl-PL" dirty="0"/>
+            </a:br>
+            <a:r>
+              <a:rPr lang="pl-PL" dirty="0"/>
+              <a:t>  </a:t>
+            </a:r>
+            <a:r>
+              <a:rPr lang="pl-PL" sz="1200" b="1" kern="1200" dirty="0" err="1">
+                <a:solidFill>
+                  <a:schemeClr val="tx1"/>
+                </a:solidFill>
+                <a:effectLst/>
+                <a:latin typeface="+mn-lt"/>
+                <a:ea typeface="+mn-ea"/>
+                <a:cs typeface="+mn-cs"/>
+              </a:rPr>
+              <a:t>case</a:t>
+            </a:r>
+            <a:r>
+              <a:rPr lang="pl-PL" sz="1200" b="1" kern="1200" dirty="0">
+                <a:solidFill>
+                  <a:schemeClr val="tx1"/>
+                </a:solidFill>
+                <a:effectLst/>
+                <a:latin typeface="+mn-lt"/>
+                <a:ea typeface="+mn-ea"/>
+                <a:cs typeface="+mn-cs"/>
+              </a:rPr>
+              <a:t> </a:t>
+            </a:r>
+            <a:r>
+              <a:rPr lang="pl-PL" sz="1200" b="1" kern="1200" dirty="0" err="1">
+                <a:solidFill>
+                  <a:schemeClr val="tx1"/>
+                </a:solidFill>
+                <a:effectLst/>
+                <a:latin typeface="+mn-lt"/>
+                <a:ea typeface="+mn-ea"/>
+                <a:cs typeface="+mn-cs"/>
+              </a:rPr>
+              <a:t>class</a:t>
+            </a:r>
+            <a:r>
+              <a:rPr lang="pl-PL" sz="1200" b="1" kern="1200" dirty="0">
+                <a:solidFill>
+                  <a:schemeClr val="tx1"/>
+                </a:solidFill>
+                <a:effectLst/>
+                <a:latin typeface="+mn-lt"/>
+                <a:ea typeface="+mn-ea"/>
+                <a:cs typeface="+mn-cs"/>
+              </a:rPr>
+              <a:t> </a:t>
+            </a:r>
+            <a:r>
+              <a:rPr lang="pl-PL" dirty="0" err="1"/>
+              <a:t>Character</a:t>
+            </a:r>
+            <a:r>
+              <a:rPr lang="pl-PL" dirty="0"/>
+              <a:t>(</a:t>
+            </a:r>
+            <a:r>
+              <a:rPr lang="pl-PL" dirty="0" err="1"/>
+              <a:t>PrimaryName</a:t>
+            </a:r>
+            <a:r>
+              <a:rPr lang="pl-PL" dirty="0"/>
+              <a:t>: </a:t>
+            </a:r>
+            <a:r>
+              <a:rPr lang="pl-PL" sz="1200" kern="1200" dirty="0">
+                <a:solidFill>
+                  <a:schemeClr val="tx1"/>
+                </a:solidFill>
+                <a:effectLst/>
+                <a:latin typeface="+mn-lt"/>
+                <a:ea typeface="+mn-ea"/>
+                <a:cs typeface="+mn-cs"/>
+              </a:rPr>
+              <a:t>String, </a:t>
+            </a:r>
+            <a:r>
+              <a:rPr lang="pl-PL" dirty="0" err="1"/>
+              <a:t>isbThief</a:t>
+            </a:r>
+            <a:r>
+              <a:rPr lang="pl-PL" dirty="0"/>
+              <a:t>: </a:t>
+            </a:r>
+            <a:r>
+              <a:rPr lang="pl-PL" sz="1200" kern="1200" dirty="0" err="1">
+                <a:solidFill>
+                  <a:schemeClr val="tx1"/>
+                </a:solidFill>
+                <a:effectLst/>
+                <a:latin typeface="+mn-lt"/>
+                <a:ea typeface="+mn-ea"/>
+                <a:cs typeface="+mn-cs"/>
+              </a:rPr>
+              <a:t>Boolean</a:t>
+            </a:r>
+            <a:r>
+              <a:rPr lang="pl-PL" dirty="0"/>
+              <a:t>) {</a:t>
+            </a:r>
+            <a:br>
+              <a:rPr lang="pl-PL" dirty="0"/>
+            </a:br>
+            <a:r>
+              <a:rPr lang="pl-PL" dirty="0"/>
+              <a:t>  }</a:t>
+            </a:r>
+            <a:br>
+              <a:rPr lang="pl-PL" dirty="0"/>
+            </a:br>
+            <a:br>
+              <a:rPr lang="pl-PL" dirty="0"/>
+            </a:br>
+            <a:r>
+              <a:rPr lang="pl-PL" dirty="0"/>
+              <a:t>  </a:t>
+            </a:r>
+            <a:r>
+              <a:rPr lang="pl-PL" sz="1200" b="1" kern="1200" dirty="0" err="1">
+                <a:solidFill>
+                  <a:schemeClr val="tx1"/>
+                </a:solidFill>
+                <a:effectLst/>
+                <a:latin typeface="+mn-lt"/>
+                <a:ea typeface="+mn-ea"/>
+                <a:cs typeface="+mn-cs"/>
+              </a:rPr>
+              <a:t>val</a:t>
+            </a:r>
+            <a:r>
+              <a:rPr lang="pl-PL" sz="1200" b="1" kern="1200" dirty="0">
+                <a:solidFill>
+                  <a:schemeClr val="tx1"/>
+                </a:solidFill>
+                <a:effectLst/>
+                <a:latin typeface="+mn-lt"/>
+                <a:ea typeface="+mn-ea"/>
+                <a:cs typeface="+mn-cs"/>
+              </a:rPr>
+              <a:t> </a:t>
+            </a:r>
+            <a:r>
+              <a:rPr lang="pl-PL" sz="1200" i="1" kern="1200" dirty="0">
+                <a:solidFill>
+                  <a:schemeClr val="tx1"/>
+                </a:solidFill>
+                <a:effectLst/>
+                <a:latin typeface="+mn-lt"/>
+                <a:ea typeface="+mn-ea"/>
+                <a:cs typeface="+mn-cs"/>
+              </a:rPr>
+              <a:t>h </a:t>
+            </a:r>
+            <a:r>
+              <a:rPr lang="pl-PL" dirty="0"/>
+              <a:t>= </a:t>
+            </a:r>
+            <a:r>
+              <a:rPr lang="pl-PL" i="1" dirty="0" err="1">
+                <a:effectLst/>
+              </a:rPr>
+              <a:t>Character</a:t>
+            </a:r>
+            <a:r>
+              <a:rPr lang="pl-PL" dirty="0"/>
+              <a:t>(</a:t>
+            </a:r>
+            <a:r>
+              <a:rPr lang="pl-PL" sz="1200" kern="1200" dirty="0">
+                <a:solidFill>
+                  <a:schemeClr val="tx1"/>
+                </a:solidFill>
+                <a:effectLst/>
+                <a:latin typeface="+mn-lt"/>
+                <a:ea typeface="+mn-ea"/>
+                <a:cs typeface="+mn-cs"/>
+              </a:rPr>
+              <a:t>"</a:t>
+            </a:r>
+            <a:r>
+              <a:rPr lang="pl-PL" sz="1200" kern="1200" dirty="0" err="1">
+                <a:solidFill>
+                  <a:schemeClr val="tx1"/>
+                </a:solidFill>
+                <a:effectLst/>
+                <a:latin typeface="+mn-lt"/>
+                <a:ea typeface="+mn-ea"/>
+                <a:cs typeface="+mn-cs"/>
+              </a:rPr>
+              <a:t>Frodo</a:t>
+            </a:r>
+            <a:r>
+              <a:rPr lang="pl-PL" sz="1200" kern="1200" dirty="0">
+                <a:solidFill>
+                  <a:schemeClr val="tx1"/>
+                </a:solidFill>
+                <a:effectLst/>
+                <a:latin typeface="+mn-lt"/>
+                <a:ea typeface="+mn-ea"/>
+                <a:cs typeface="+mn-cs"/>
+              </a:rPr>
+              <a:t> </a:t>
+            </a:r>
+            <a:r>
+              <a:rPr lang="pl-PL" sz="1200" kern="1200" dirty="0" err="1">
+                <a:solidFill>
+                  <a:schemeClr val="tx1"/>
+                </a:solidFill>
+                <a:effectLst/>
+                <a:latin typeface="+mn-lt"/>
+                <a:ea typeface="+mn-ea"/>
+                <a:cs typeface="+mn-cs"/>
+              </a:rPr>
+              <a:t>Baggins</a:t>
+            </a:r>
+            <a:r>
+              <a:rPr lang="pl-PL" sz="1200" kern="1200" dirty="0">
+                <a:solidFill>
+                  <a:schemeClr val="tx1"/>
+                </a:solidFill>
+                <a:effectLst/>
+                <a:latin typeface="+mn-lt"/>
+                <a:ea typeface="+mn-ea"/>
+                <a:cs typeface="+mn-cs"/>
+              </a:rPr>
+              <a:t>", </a:t>
+            </a:r>
+            <a:r>
+              <a:rPr lang="pl-PL" sz="1200" b="1" kern="1200" dirty="0" err="1">
+                <a:solidFill>
+                  <a:schemeClr val="tx1"/>
+                </a:solidFill>
+                <a:effectLst/>
+                <a:latin typeface="+mn-lt"/>
+                <a:ea typeface="+mn-ea"/>
+                <a:cs typeface="+mn-cs"/>
+              </a:rPr>
+              <a:t>false</a:t>
+            </a:r>
+            <a:r>
+              <a:rPr lang="pl-PL" dirty="0"/>
+              <a:t>)</a:t>
+            </a:r>
+            <a:br>
+              <a:rPr lang="pl-PL" dirty="0"/>
+            </a:br>
+            <a:br>
+              <a:rPr lang="pl-PL" dirty="0"/>
+            </a:br>
+            <a:r>
+              <a:rPr lang="pl-PL" dirty="0"/>
+              <a:t>  </a:t>
+            </a:r>
+            <a:r>
+              <a:rPr lang="pl-PL" sz="1200" b="1" kern="1200" dirty="0" err="1">
+                <a:solidFill>
+                  <a:schemeClr val="tx1"/>
+                </a:solidFill>
+                <a:effectLst/>
+                <a:latin typeface="+mn-lt"/>
+                <a:ea typeface="+mn-ea"/>
+                <a:cs typeface="+mn-cs"/>
+              </a:rPr>
+              <a:t>val</a:t>
+            </a:r>
+            <a:r>
+              <a:rPr lang="pl-PL" sz="1200" b="1" kern="1200" dirty="0">
+                <a:solidFill>
+                  <a:schemeClr val="tx1"/>
+                </a:solidFill>
+                <a:effectLst/>
+                <a:latin typeface="+mn-lt"/>
+                <a:ea typeface="+mn-ea"/>
+                <a:cs typeface="+mn-cs"/>
+              </a:rPr>
+              <a:t> </a:t>
+            </a:r>
+            <a:r>
+              <a:rPr lang="pl-PL" sz="1200" i="1" kern="1200" dirty="0" err="1">
+                <a:solidFill>
+                  <a:schemeClr val="tx1"/>
+                </a:solidFill>
+                <a:effectLst/>
+                <a:latin typeface="+mn-lt"/>
+                <a:ea typeface="+mn-ea"/>
+                <a:cs typeface="+mn-cs"/>
+              </a:rPr>
+              <a:t>resp</a:t>
+            </a:r>
+            <a:r>
+              <a:rPr lang="pl-PL" sz="1200" i="1" kern="1200" dirty="0">
+                <a:solidFill>
+                  <a:schemeClr val="tx1"/>
+                </a:solidFill>
+                <a:effectLst/>
+                <a:latin typeface="+mn-lt"/>
+                <a:ea typeface="+mn-ea"/>
+                <a:cs typeface="+mn-cs"/>
+              </a:rPr>
+              <a:t> </a:t>
+            </a:r>
+            <a:r>
+              <a:rPr lang="pl-PL" dirty="0"/>
+              <a:t>= </a:t>
+            </a:r>
+            <a:r>
+              <a:rPr lang="pl-PL" sz="1200" i="1" kern="1200" dirty="0">
+                <a:solidFill>
+                  <a:schemeClr val="tx1"/>
+                </a:solidFill>
+                <a:effectLst/>
+                <a:latin typeface="+mn-lt"/>
+                <a:ea typeface="+mn-ea"/>
+                <a:cs typeface="+mn-cs"/>
+              </a:rPr>
+              <a:t>h </a:t>
+            </a:r>
+            <a:r>
+              <a:rPr lang="pl-PL" sz="1200" b="1" kern="1200" dirty="0" err="1">
+                <a:solidFill>
+                  <a:schemeClr val="tx1"/>
+                </a:solidFill>
+                <a:effectLst/>
+                <a:latin typeface="+mn-lt"/>
+                <a:ea typeface="+mn-ea"/>
+                <a:cs typeface="+mn-cs"/>
+              </a:rPr>
+              <a:t>match</a:t>
+            </a:r>
+            <a:r>
+              <a:rPr lang="pl-PL" sz="1200" b="1" kern="1200" dirty="0">
+                <a:solidFill>
+                  <a:schemeClr val="tx1"/>
+                </a:solidFill>
+                <a:effectLst/>
+                <a:latin typeface="+mn-lt"/>
+                <a:ea typeface="+mn-ea"/>
+                <a:cs typeface="+mn-cs"/>
+              </a:rPr>
+              <a:t> </a:t>
+            </a:r>
+            <a:r>
+              <a:rPr lang="pl-PL" dirty="0"/>
+              <a:t>{</a:t>
+            </a:r>
+            <a:br>
+              <a:rPr lang="pl-PL" dirty="0"/>
+            </a:br>
+            <a:r>
+              <a:rPr lang="pl-PL" dirty="0"/>
+              <a:t>    </a:t>
+            </a:r>
+            <a:r>
+              <a:rPr lang="pl-PL" sz="1200" b="1" kern="1200" dirty="0" err="1">
+                <a:solidFill>
+                  <a:schemeClr val="tx1"/>
+                </a:solidFill>
+                <a:effectLst/>
+                <a:latin typeface="+mn-lt"/>
+                <a:ea typeface="+mn-ea"/>
+                <a:cs typeface="+mn-cs"/>
+              </a:rPr>
+              <a:t>case</a:t>
+            </a:r>
+            <a:r>
+              <a:rPr lang="pl-PL" sz="1200" b="1" kern="1200" dirty="0">
+                <a:solidFill>
+                  <a:schemeClr val="tx1"/>
+                </a:solidFill>
+                <a:effectLst/>
+                <a:latin typeface="+mn-lt"/>
+                <a:ea typeface="+mn-ea"/>
+                <a:cs typeface="+mn-cs"/>
+              </a:rPr>
+              <a:t> </a:t>
+            </a:r>
+            <a:r>
+              <a:rPr lang="pl-PL" i="1" dirty="0" err="1">
+                <a:effectLst/>
+              </a:rPr>
+              <a:t>Character</a:t>
+            </a:r>
+            <a:r>
+              <a:rPr lang="pl-PL" dirty="0"/>
+              <a:t>(x</a:t>
+            </a:r>
+            <a:r>
+              <a:rPr lang="pl-PL" sz="1200" kern="1200" dirty="0">
+                <a:solidFill>
+                  <a:schemeClr val="tx1"/>
+                </a:solidFill>
+                <a:effectLst/>
+                <a:latin typeface="+mn-lt"/>
+                <a:ea typeface="+mn-ea"/>
+                <a:cs typeface="+mn-cs"/>
+              </a:rPr>
+              <a:t>, </a:t>
+            </a:r>
+            <a:r>
+              <a:rPr lang="pl-PL" sz="1200" b="1" kern="1200" dirty="0" err="1">
+                <a:solidFill>
+                  <a:schemeClr val="tx1"/>
+                </a:solidFill>
+                <a:effectLst/>
+                <a:latin typeface="+mn-lt"/>
+                <a:ea typeface="+mn-ea"/>
+                <a:cs typeface="+mn-cs"/>
+              </a:rPr>
+              <a:t>true</a:t>
+            </a:r>
+            <a:r>
+              <a:rPr lang="pl-PL" dirty="0"/>
+              <a:t>) =&gt; </a:t>
+            </a:r>
+            <a:r>
+              <a:rPr lang="pl-PL" sz="1200" kern="1200" dirty="0" err="1">
+                <a:solidFill>
+                  <a:schemeClr val="tx1"/>
+                </a:solidFill>
+                <a:effectLst/>
+                <a:latin typeface="+mn-lt"/>
+                <a:ea typeface="+mn-ea"/>
+                <a:cs typeface="+mn-cs"/>
+              </a:rPr>
+              <a:t>s"</a:t>
+            </a:r>
+            <a:r>
+              <a:rPr lang="pl-PL" sz="1200" b="1" kern="1200" dirty="0" err="1">
+                <a:solidFill>
+                  <a:schemeClr val="tx1"/>
+                </a:solidFill>
+                <a:effectLst/>
+                <a:latin typeface="+mn-lt"/>
+                <a:ea typeface="+mn-ea"/>
+                <a:cs typeface="+mn-cs"/>
+              </a:rPr>
+              <a:t>$</a:t>
+            </a:r>
+            <a:r>
+              <a:rPr lang="pl-PL" dirty="0" err="1"/>
+              <a:t>x</a:t>
+            </a:r>
+            <a:r>
+              <a:rPr lang="pl-PL" sz="1200" kern="1200" dirty="0">
+                <a:solidFill>
+                  <a:schemeClr val="tx1"/>
+                </a:solidFill>
+                <a:effectLst/>
+                <a:latin typeface="+mn-lt"/>
+                <a:ea typeface="+mn-ea"/>
+                <a:cs typeface="+mn-cs"/>
+              </a:rPr>
+              <a:t> </a:t>
+            </a:r>
+            <a:r>
+              <a:rPr lang="pl-PL" sz="1200" kern="1200" dirty="0" err="1">
+                <a:solidFill>
+                  <a:schemeClr val="tx1"/>
+                </a:solidFill>
+                <a:effectLst/>
+                <a:latin typeface="+mn-lt"/>
+                <a:ea typeface="+mn-ea"/>
+                <a:cs typeface="+mn-cs"/>
+              </a:rPr>
+              <a:t>is</a:t>
+            </a:r>
+            <a:r>
+              <a:rPr lang="pl-PL" sz="1200" kern="1200" dirty="0">
+                <a:solidFill>
+                  <a:schemeClr val="tx1"/>
+                </a:solidFill>
+                <a:effectLst/>
+                <a:latin typeface="+mn-lt"/>
+                <a:ea typeface="+mn-ea"/>
+                <a:cs typeface="+mn-cs"/>
+              </a:rPr>
+              <a:t> a </a:t>
+            </a:r>
+            <a:r>
+              <a:rPr lang="pl-PL" sz="1200" kern="1200" dirty="0" err="1">
+                <a:solidFill>
+                  <a:schemeClr val="tx1"/>
+                </a:solidFill>
+                <a:effectLst/>
+                <a:latin typeface="+mn-lt"/>
+                <a:ea typeface="+mn-ea"/>
+                <a:cs typeface="+mn-cs"/>
+              </a:rPr>
+              <a:t>thief</a:t>
+            </a:r>
+            <a:r>
+              <a:rPr lang="pl-PL" sz="1200" kern="1200" dirty="0">
+                <a:solidFill>
+                  <a:schemeClr val="tx1"/>
+                </a:solidFill>
+                <a:effectLst/>
+                <a:latin typeface="+mn-lt"/>
+                <a:ea typeface="+mn-ea"/>
+                <a:cs typeface="+mn-cs"/>
+              </a:rPr>
+              <a:t>"</a:t>
+            </a:r>
+            <a:br>
+              <a:rPr lang="pl-PL" sz="1200" kern="1200" dirty="0">
+                <a:solidFill>
+                  <a:schemeClr val="tx1"/>
+                </a:solidFill>
+                <a:effectLst/>
+                <a:latin typeface="+mn-lt"/>
+                <a:ea typeface="+mn-ea"/>
+                <a:cs typeface="+mn-cs"/>
+              </a:rPr>
+            </a:br>
+            <a:r>
+              <a:rPr lang="pl-PL" sz="1200" kern="1200" dirty="0">
+                <a:solidFill>
+                  <a:schemeClr val="tx1"/>
+                </a:solidFill>
+                <a:effectLst/>
+                <a:latin typeface="+mn-lt"/>
+                <a:ea typeface="+mn-ea"/>
+                <a:cs typeface="+mn-cs"/>
+              </a:rPr>
+              <a:t>    </a:t>
+            </a:r>
+            <a:r>
+              <a:rPr lang="pl-PL" sz="1200" b="1" kern="1200" dirty="0" err="1">
+                <a:solidFill>
+                  <a:schemeClr val="tx1"/>
+                </a:solidFill>
+                <a:effectLst/>
+                <a:latin typeface="+mn-lt"/>
+                <a:ea typeface="+mn-ea"/>
+                <a:cs typeface="+mn-cs"/>
+              </a:rPr>
+              <a:t>case</a:t>
+            </a:r>
+            <a:r>
+              <a:rPr lang="pl-PL" sz="1200" b="1" kern="1200" dirty="0">
+                <a:solidFill>
+                  <a:schemeClr val="tx1"/>
+                </a:solidFill>
+                <a:effectLst/>
+                <a:latin typeface="+mn-lt"/>
+                <a:ea typeface="+mn-ea"/>
+                <a:cs typeface="+mn-cs"/>
+              </a:rPr>
+              <a:t> </a:t>
+            </a:r>
+            <a:r>
+              <a:rPr lang="pl-PL" i="1" dirty="0" err="1">
+                <a:effectLst/>
+              </a:rPr>
+              <a:t>Character</a:t>
+            </a:r>
+            <a:r>
+              <a:rPr lang="pl-PL" dirty="0"/>
+              <a:t>(x</a:t>
+            </a:r>
+            <a:r>
+              <a:rPr lang="pl-PL" sz="1200" kern="1200" dirty="0">
+                <a:solidFill>
+                  <a:schemeClr val="tx1"/>
+                </a:solidFill>
+                <a:effectLst/>
+                <a:latin typeface="+mn-lt"/>
+                <a:ea typeface="+mn-ea"/>
+                <a:cs typeface="+mn-cs"/>
+              </a:rPr>
+              <a:t>, </a:t>
+            </a:r>
+            <a:r>
+              <a:rPr lang="pl-PL" sz="1200" b="1" kern="1200" dirty="0" err="1">
+                <a:solidFill>
+                  <a:schemeClr val="tx1"/>
+                </a:solidFill>
+                <a:effectLst/>
+                <a:latin typeface="+mn-lt"/>
+                <a:ea typeface="+mn-ea"/>
+                <a:cs typeface="+mn-cs"/>
+              </a:rPr>
+              <a:t>false</a:t>
+            </a:r>
+            <a:r>
+              <a:rPr lang="pl-PL" dirty="0"/>
+              <a:t>) =&gt; </a:t>
+            </a:r>
+            <a:r>
+              <a:rPr lang="pl-PL" sz="1200" kern="1200" dirty="0" err="1">
+                <a:solidFill>
+                  <a:schemeClr val="tx1"/>
+                </a:solidFill>
+                <a:effectLst/>
+                <a:latin typeface="+mn-lt"/>
+                <a:ea typeface="+mn-ea"/>
+                <a:cs typeface="+mn-cs"/>
+              </a:rPr>
+              <a:t>s"</a:t>
+            </a:r>
+            <a:r>
+              <a:rPr lang="pl-PL" sz="1200" b="1" kern="1200" dirty="0" err="1">
+                <a:solidFill>
+                  <a:schemeClr val="tx1"/>
+                </a:solidFill>
+                <a:effectLst/>
+                <a:latin typeface="+mn-lt"/>
+                <a:ea typeface="+mn-ea"/>
+                <a:cs typeface="+mn-cs"/>
+              </a:rPr>
+              <a:t>$</a:t>
+            </a:r>
+            <a:r>
+              <a:rPr lang="pl-PL" dirty="0" err="1"/>
+              <a:t>x</a:t>
+            </a:r>
+            <a:r>
+              <a:rPr lang="pl-PL" sz="1200" kern="1200" dirty="0">
+                <a:solidFill>
+                  <a:schemeClr val="tx1"/>
+                </a:solidFill>
+                <a:effectLst/>
+                <a:latin typeface="+mn-lt"/>
+                <a:ea typeface="+mn-ea"/>
+                <a:cs typeface="+mn-cs"/>
+              </a:rPr>
+              <a:t> </a:t>
+            </a:r>
+            <a:r>
+              <a:rPr lang="pl-PL" sz="1200" kern="1200" dirty="0" err="1">
+                <a:solidFill>
+                  <a:schemeClr val="tx1"/>
+                </a:solidFill>
+                <a:effectLst/>
+                <a:latin typeface="+mn-lt"/>
+                <a:ea typeface="+mn-ea"/>
+                <a:cs typeface="+mn-cs"/>
+              </a:rPr>
+              <a:t>is</a:t>
+            </a:r>
+            <a:r>
+              <a:rPr lang="pl-PL" sz="1200" kern="1200" dirty="0">
+                <a:solidFill>
+                  <a:schemeClr val="tx1"/>
+                </a:solidFill>
+                <a:effectLst/>
+                <a:latin typeface="+mn-lt"/>
+                <a:ea typeface="+mn-ea"/>
+                <a:cs typeface="+mn-cs"/>
+              </a:rPr>
+              <a:t> not a </a:t>
+            </a:r>
+            <a:r>
+              <a:rPr lang="pl-PL" sz="1200" kern="1200" dirty="0" err="1">
+                <a:solidFill>
+                  <a:schemeClr val="tx1"/>
+                </a:solidFill>
+                <a:effectLst/>
+                <a:latin typeface="+mn-lt"/>
+                <a:ea typeface="+mn-ea"/>
+                <a:cs typeface="+mn-cs"/>
+              </a:rPr>
+              <a:t>thief</a:t>
+            </a:r>
+            <a:r>
+              <a:rPr lang="pl-PL" sz="1200" kern="1200" dirty="0">
+                <a:solidFill>
+                  <a:schemeClr val="tx1"/>
+                </a:solidFill>
+                <a:effectLst/>
+                <a:latin typeface="+mn-lt"/>
+                <a:ea typeface="+mn-ea"/>
+                <a:cs typeface="+mn-cs"/>
+              </a:rPr>
+              <a:t>"</a:t>
+            </a:r>
+            <a:br>
+              <a:rPr lang="pl-PL" sz="1200" kern="1200" dirty="0">
+                <a:solidFill>
+                  <a:schemeClr val="tx1"/>
+                </a:solidFill>
+                <a:effectLst/>
+                <a:latin typeface="+mn-lt"/>
+                <a:ea typeface="+mn-ea"/>
+                <a:cs typeface="+mn-cs"/>
+              </a:rPr>
+            </a:br>
+            <a:r>
+              <a:rPr lang="pl-PL" sz="1200" kern="1200" dirty="0">
+                <a:solidFill>
+                  <a:schemeClr val="tx1"/>
+                </a:solidFill>
+                <a:effectLst/>
+                <a:latin typeface="+mn-lt"/>
+                <a:ea typeface="+mn-ea"/>
+                <a:cs typeface="+mn-cs"/>
+              </a:rPr>
+              <a:t>  </a:t>
+            </a:r>
+            <a:r>
+              <a:rPr lang="pl-PL" dirty="0"/>
+              <a:t>}</a:t>
+            </a:r>
+            <a:br>
+              <a:rPr lang="pl-PL" dirty="0"/>
+            </a:br>
+            <a:br>
+              <a:rPr lang="pl-PL" dirty="0"/>
+            </a:br>
+            <a:r>
+              <a:rPr lang="pl-PL" dirty="0"/>
+              <a:t>  </a:t>
+            </a:r>
+            <a:r>
+              <a:rPr lang="pl-PL" i="1" dirty="0" err="1">
+                <a:effectLst/>
+              </a:rPr>
+              <a:t>println</a:t>
+            </a:r>
+            <a:r>
+              <a:rPr lang="pl-PL" dirty="0"/>
+              <a:t>(</a:t>
+            </a:r>
+            <a:r>
+              <a:rPr lang="pl-PL" sz="1200" i="1" kern="1200" dirty="0" err="1">
+                <a:solidFill>
+                  <a:schemeClr val="tx1"/>
+                </a:solidFill>
+                <a:effectLst/>
+                <a:latin typeface="+mn-lt"/>
+                <a:ea typeface="+mn-ea"/>
+                <a:cs typeface="+mn-cs"/>
+              </a:rPr>
+              <a:t>resp</a:t>
+            </a:r>
+            <a:r>
+              <a:rPr lang="pl-PL" dirty="0"/>
+              <a:t>)</a:t>
+            </a:r>
+            <a:br>
+              <a:rPr lang="pl-PL" dirty="0"/>
+            </a:br>
+            <a:r>
+              <a:rPr lang="pl-PL" dirty="0"/>
+              <a:t>}</a:t>
+            </a:r>
+            <a:br>
+              <a:rPr lang="pl-PL" dirty="0"/>
+            </a:br>
             <a:endParaRPr lang="pl-PL" dirty="0"/>
           </a:p>
         </p:txBody>
@@ -1826,7 +2447,7 @@
     </p:spTree>
     <p:extLst>
       <p:ext uri="{BB962C8B-B14F-4D97-AF65-F5344CB8AC3E}">
-        <p14:creationId xmlns:p14="http://schemas.microsoft.com/office/powerpoint/2010/main" val="1359792266"/>
+        <p14:creationId xmlns:p14="http://schemas.microsoft.com/office/powerpoint/2010/main" val="3267287691"/>
       </p:ext>
     </p:extLst>
   </p:cSld>
@@ -1880,17 +2501,149 @@
           <a:bodyPr/>
           <a:lstStyle/>
           <a:p>
-            <a:r>
-              <a:rPr lang="en-US" sz="1200" b="0" i="0" u="none" strike="noStrike" kern="1200" baseline="0" dirty="0">
-                <a:solidFill>
-                  <a:schemeClr val="tx1"/>
-                </a:solidFill>
-                <a:latin typeface="+mn-lt"/>
-                <a:ea typeface="+mn-ea"/>
-                <a:cs typeface="+mn-cs"/>
+            <a:pPr marL="0" indent="0">
+              <a:buNone/>
+            </a:pPr>
+            <a:r>
+              <a:rPr lang="pl-PL" sz="1200" dirty="0">
+                <a:latin typeface="Courier New" panose="02070309020205020404" pitchFamily="49" charset="0"/>
+                <a:cs typeface="Courier New" panose="02070309020205020404" pitchFamily="49" charset="0"/>
               </a:rPr>
-              <a:t>types, regular expressions, numeric ranges, and data structure contents</a:t>
-            </a:r>
+              <a:t>&lt;</a:t>
+            </a:r>
+            <a:r>
+              <a:rPr lang="pl-PL" sz="1200" dirty="0" err="1">
+                <a:latin typeface="Courier New" panose="02070309020205020404" pitchFamily="49" charset="0"/>
+                <a:cs typeface="Courier New" panose="02070309020205020404" pitchFamily="49" charset="0"/>
+              </a:rPr>
+              <a:t>expression</a:t>
+            </a:r>
+            <a:r>
+              <a:rPr lang="pl-PL" sz="1200" dirty="0">
+                <a:latin typeface="Courier New" panose="02070309020205020404" pitchFamily="49" charset="0"/>
+                <a:cs typeface="Courier New" panose="02070309020205020404" pitchFamily="49" charset="0"/>
+              </a:rPr>
+              <a:t>&gt; </a:t>
+            </a:r>
+            <a:r>
+              <a:rPr lang="pl-PL" sz="1200" dirty="0" err="1">
+                <a:latin typeface="Courier New" panose="02070309020205020404" pitchFamily="49" charset="0"/>
+                <a:cs typeface="Courier New" panose="02070309020205020404" pitchFamily="49" charset="0"/>
+              </a:rPr>
+              <a:t>match</a:t>
+            </a:r>
+            <a:r>
+              <a:rPr lang="pl-PL" sz="1200" dirty="0">
+                <a:latin typeface="Courier New" panose="02070309020205020404" pitchFamily="49" charset="0"/>
+                <a:cs typeface="Courier New" panose="02070309020205020404" pitchFamily="49" charset="0"/>
+              </a:rPr>
+              <a:t> {</a:t>
+            </a:r>
+          </a:p>
+          <a:p>
+            <a:pPr marL="0" indent="0">
+              <a:buNone/>
+            </a:pPr>
+            <a:r>
+              <a:rPr lang="pl-PL" sz="1200" dirty="0" err="1">
+                <a:latin typeface="Courier New" panose="02070309020205020404" pitchFamily="49" charset="0"/>
+                <a:cs typeface="Courier New" panose="02070309020205020404" pitchFamily="49" charset="0"/>
+              </a:rPr>
+              <a:t>case</a:t>
+            </a:r>
+            <a:r>
+              <a:rPr lang="pl-PL" sz="1200" dirty="0">
+                <a:latin typeface="Courier New" panose="02070309020205020404" pitchFamily="49" charset="0"/>
+                <a:cs typeface="Courier New" panose="02070309020205020404" pitchFamily="49" charset="0"/>
+              </a:rPr>
+              <a:t> &lt;</a:t>
+            </a:r>
+            <a:r>
+              <a:rPr lang="pl-PL" sz="1200" dirty="0" err="1">
+                <a:latin typeface="Courier New" panose="02070309020205020404" pitchFamily="49" charset="0"/>
+                <a:cs typeface="Courier New" panose="02070309020205020404" pitchFamily="49" charset="0"/>
+              </a:rPr>
+              <a:t>pattern</a:t>
+            </a:r>
+            <a:r>
+              <a:rPr lang="pl-PL" sz="1200" dirty="0">
+                <a:latin typeface="Courier New" panose="02070309020205020404" pitchFamily="49" charset="0"/>
+                <a:cs typeface="Courier New" panose="02070309020205020404" pitchFamily="49" charset="0"/>
+              </a:rPr>
+              <a:t> </a:t>
+            </a:r>
+            <a:r>
+              <a:rPr lang="pl-PL" sz="1200" dirty="0" err="1">
+                <a:latin typeface="Courier New" panose="02070309020205020404" pitchFamily="49" charset="0"/>
+                <a:cs typeface="Courier New" panose="02070309020205020404" pitchFamily="49" charset="0"/>
+              </a:rPr>
+              <a:t>match</a:t>
+            </a:r>
+            <a:r>
+              <a:rPr lang="pl-PL" sz="1200" dirty="0">
+                <a:latin typeface="Courier New" panose="02070309020205020404" pitchFamily="49" charset="0"/>
+                <a:cs typeface="Courier New" panose="02070309020205020404" pitchFamily="49" charset="0"/>
+              </a:rPr>
+              <a:t>&gt; =&gt; &lt;</a:t>
+            </a:r>
+            <a:r>
+              <a:rPr lang="pl-PL" sz="1200" dirty="0" err="1">
+                <a:latin typeface="Courier New" panose="02070309020205020404" pitchFamily="49" charset="0"/>
+                <a:cs typeface="Courier New" panose="02070309020205020404" pitchFamily="49" charset="0"/>
+              </a:rPr>
+              <a:t>expression</a:t>
+            </a:r>
+            <a:r>
+              <a:rPr lang="pl-PL" sz="1200" dirty="0">
+                <a:latin typeface="Courier New" panose="02070309020205020404" pitchFamily="49" charset="0"/>
+                <a:cs typeface="Courier New" panose="02070309020205020404" pitchFamily="49" charset="0"/>
+              </a:rPr>
+              <a:t>&gt;</a:t>
+            </a:r>
+          </a:p>
+          <a:p>
+            <a:pPr marL="0" indent="0">
+              <a:buNone/>
+            </a:pPr>
+            <a:r>
+              <a:rPr lang="pl-PL" sz="1200" dirty="0">
+                <a:latin typeface="Courier New" panose="02070309020205020404" pitchFamily="49" charset="0"/>
+                <a:cs typeface="Courier New" panose="02070309020205020404" pitchFamily="49" charset="0"/>
+              </a:rPr>
+              <a:t>[</a:t>
+            </a:r>
+            <a:r>
+              <a:rPr lang="pl-PL" sz="1200" dirty="0" err="1">
+                <a:latin typeface="Courier New" panose="02070309020205020404" pitchFamily="49" charset="0"/>
+                <a:cs typeface="Courier New" panose="02070309020205020404" pitchFamily="49" charset="0"/>
+              </a:rPr>
+              <a:t>case</a:t>
+            </a:r>
+            <a:r>
+              <a:rPr lang="pl-PL" sz="1200" dirty="0">
+                <a:latin typeface="Courier New" panose="02070309020205020404" pitchFamily="49" charset="0"/>
+                <a:cs typeface="Courier New" panose="02070309020205020404" pitchFamily="49" charset="0"/>
+              </a:rPr>
+              <a:t>...]</a:t>
+            </a:r>
+          </a:p>
+          <a:p>
+            <a:pPr marL="0" indent="0">
+              <a:buNone/>
+            </a:pPr>
+            <a:r>
+              <a:rPr lang="pl-PL" sz="1200" dirty="0">
+                <a:latin typeface="Courier New" panose="02070309020205020404" pitchFamily="49" charset="0"/>
+                <a:cs typeface="Courier New" panose="02070309020205020404" pitchFamily="49" charset="0"/>
+              </a:rPr>
+              <a:t>}</a:t>
+            </a:r>
+            <a:endParaRPr lang="pl-PL" sz="2000" dirty="0">
+              <a:latin typeface="Courier New" panose="02070309020205020404" pitchFamily="49" charset="0"/>
+              <a:cs typeface="Courier New" panose="02070309020205020404" pitchFamily="49" charset="0"/>
+            </a:endParaRPr>
+          </a:p>
+          <a:p>
             <a:endParaRPr lang="pl-PL" dirty="0"/>
           </a:p>
         </p:txBody>
@@ -1952,6 +2705,414 @@
           <a:bodyPr/>
           <a:lstStyle/>
           <a:p>
+            <a:r>
+              <a:rPr lang="pl-PL" dirty="0"/>
+              <a:t>First </a:t>
+            </a:r>
+            <a:r>
+              <a:rPr lang="pl-PL" dirty="0" err="1"/>
+              <a:t>class</a:t>
+            </a:r>
+            <a:r>
+              <a:rPr lang="pl-PL" dirty="0"/>
+              <a:t> </a:t>
+            </a:r>
+            <a:r>
+              <a:rPr lang="pl-PL" dirty="0" err="1"/>
+              <a:t>citizien</a:t>
+            </a:r>
+            <a:r>
+              <a:rPr lang="pl-PL" dirty="0"/>
+              <a:t> – </a:t>
+            </a:r>
+            <a:r>
+              <a:rPr lang="pl-PL" dirty="0" err="1"/>
+              <a:t>sa</a:t>
+            </a:r>
+            <a:r>
+              <a:rPr lang="pl-PL" dirty="0"/>
+              <a:t> wszechobecne, nie są tylko </a:t>
+            </a:r>
+            <a:r>
+              <a:rPr lang="pl-PL" dirty="0" err="1"/>
+              <a:t>delarowane</a:t>
+            </a:r>
+            <a:r>
+              <a:rPr lang="pl-PL" dirty="0"/>
+              <a:t> i wykonywane ale mogą być </a:t>
+            </a:r>
+            <a:r>
+              <a:rPr lang="pl-PL" dirty="0" err="1"/>
+              <a:t>uzyte</a:t>
+            </a:r>
+            <a:r>
+              <a:rPr lang="pl-PL" dirty="0"/>
+              <a:t> jako po </a:t>
+            </a:r>
+            <a:r>
+              <a:rPr lang="pl-PL" dirty="0" err="1"/>
+              <a:t>prstu</a:t>
+            </a:r>
+            <a:r>
+              <a:rPr lang="pl-PL" dirty="0"/>
+              <a:t> typ danych.</a:t>
+            </a:r>
+          </a:p>
+          <a:p>
+            <a:r>
+              <a:rPr lang="pl-PL" dirty="0"/>
+              <a:t>Mogą wiec być </a:t>
+            </a:r>
+            <a:r>
+              <a:rPr lang="pl-PL" dirty="0" err="1"/>
+              <a:t>zdefinowane</a:t>
+            </a:r>
+            <a:r>
+              <a:rPr lang="pl-PL" dirty="0"/>
+              <a:t> jako literał, jako literał bez nazwy (czyli to co znamy z </a:t>
+            </a:r>
+            <a:r>
+              <a:rPr lang="pl-PL" dirty="0" err="1"/>
+              <a:t>javy</a:t>
+            </a:r>
+            <a:r>
+              <a:rPr lang="pl-PL" dirty="0"/>
+              <a:t> </a:t>
+            </a:r>
+            <a:r>
+              <a:rPr lang="pl-PL" dirty="0" err="1"/>
+              <a:t>javascirpt</a:t>
+            </a:r>
+            <a:r>
+              <a:rPr lang="pl-PL" dirty="0"/>
+              <a:t> jako </a:t>
+            </a:r>
+            <a:r>
+              <a:rPr lang="pl-PL" dirty="0" err="1"/>
+              <a:t>lampda</a:t>
+            </a:r>
+            <a:r>
+              <a:rPr lang="pl-PL" dirty="0"/>
+              <a:t>, bądź anonimowa funkcja), mogą być zapisane jako </a:t>
+            </a:r>
+            <a:r>
+              <a:rPr lang="pl-PL" dirty="0" err="1"/>
+              <a:t>value</a:t>
+            </a:r>
+            <a:r>
+              <a:rPr lang="pl-PL" dirty="0"/>
+              <a:t> bądź </a:t>
+            </a:r>
+            <a:r>
+              <a:rPr lang="pl-PL" dirty="0" err="1"/>
+              <a:t>variable</a:t>
+            </a:r>
+            <a:r>
+              <a:rPr lang="pl-PL" dirty="0"/>
+              <a:t> oraz </a:t>
+            </a:r>
+            <a:r>
+              <a:rPr lang="pl-PL" dirty="0" err="1"/>
+              <a:t>uzyte</a:t>
+            </a:r>
+            <a:r>
+              <a:rPr lang="pl-PL" dirty="0"/>
+              <a:t> jako </a:t>
+            </a:r>
+            <a:r>
+              <a:rPr lang="pl-PL" dirty="0" err="1"/>
+              <a:t>paramter</a:t>
+            </a:r>
+            <a:r>
+              <a:rPr lang="pl-PL" dirty="0"/>
+              <a:t> do innej funkcji bądź nawet zwrócone z innej funkcji.</a:t>
+            </a:r>
+          </a:p>
+          <a:p>
+            <a:r>
+              <a:rPr lang="pl-PL" dirty="0" err="1"/>
+              <a:t>Pure</a:t>
+            </a:r>
+            <a:r>
+              <a:rPr lang="pl-PL" dirty="0"/>
+              <a:t> </a:t>
+            </a:r>
+            <a:r>
+              <a:rPr lang="pl-PL" dirty="0" err="1"/>
+              <a:t>functions</a:t>
+            </a:r>
+            <a:r>
+              <a:rPr lang="pl-PL" dirty="0"/>
+              <a:t> – nie maja </a:t>
+            </a:r>
+            <a:r>
+              <a:rPr lang="pl-PL" dirty="0" err="1"/>
+              <a:t>side</a:t>
+            </a:r>
+            <a:r>
+              <a:rPr lang="pl-PL" dirty="0"/>
+              <a:t> </a:t>
+            </a:r>
+            <a:r>
+              <a:rPr lang="pl-PL" dirty="0" err="1"/>
+              <a:t>effectów</a:t>
+            </a:r>
+            <a:r>
+              <a:rPr lang="pl-PL" dirty="0"/>
+              <a:t>, czyli nie modyfikują stanu, są </a:t>
+            </a:r>
+            <a:r>
+              <a:rPr lang="pl-PL" dirty="0" err="1"/>
+              <a:t>stateless</a:t>
+            </a:r>
+            <a:endParaRPr lang="pl-PL" dirty="0"/>
+          </a:p>
+          <a:p>
+            <a:r>
+              <a:rPr lang="pl-PL" dirty="0"/>
+              <a:t>High-order </a:t>
+            </a:r>
+            <a:r>
+              <a:rPr lang="pl-PL" dirty="0" err="1"/>
+              <a:t>funcions</a:t>
+            </a:r>
+            <a:r>
+              <a:rPr lang="pl-PL" dirty="0"/>
+              <a:t> – przyjmują w argumencie inna funkcje bądź zwracają funkcje. Najbardziej znane to </a:t>
+            </a:r>
+            <a:r>
+              <a:rPr lang="pl-PL" sz="1200" b="0" i="0" u="none" strike="noStrike" kern="1200" baseline="0" dirty="0">
+                <a:solidFill>
+                  <a:schemeClr val="tx1"/>
+                </a:solidFill>
+                <a:latin typeface="+mn-lt"/>
+                <a:ea typeface="+mn-ea"/>
+                <a:cs typeface="+mn-cs"/>
+              </a:rPr>
+              <a:t>map() i </a:t>
+            </a:r>
+            <a:r>
+              <a:rPr lang="pl-PL" sz="1200" b="0" i="0" u="none" strike="noStrike" kern="1200" baseline="0" dirty="0" err="1">
+                <a:solidFill>
+                  <a:schemeClr val="tx1"/>
+                </a:solidFill>
+                <a:latin typeface="+mn-lt"/>
+                <a:ea typeface="+mn-ea"/>
+                <a:cs typeface="+mn-cs"/>
+              </a:rPr>
+              <a:t>reduce</a:t>
+            </a:r>
+            <a:r>
+              <a:rPr lang="pl-PL" sz="1200" b="0" i="0" u="none" strike="noStrike" kern="1200" baseline="0" dirty="0">
+                <a:solidFill>
+                  <a:schemeClr val="tx1"/>
+                </a:solidFill>
+                <a:latin typeface="+mn-lt"/>
+                <a:ea typeface="+mn-ea"/>
+                <a:cs typeface="+mn-cs"/>
+              </a:rPr>
+              <a:t>().</a:t>
+            </a:r>
+          </a:p>
+          <a:p>
+            <a:endParaRPr lang="pl-PL" sz="1200" b="0" i="0" u="none" strike="noStrike" kern="1200" baseline="0" dirty="0">
+              <a:solidFill>
+                <a:schemeClr val="tx1"/>
+              </a:solidFill>
+              <a:latin typeface="+mn-lt"/>
+              <a:ea typeface="+mn-ea"/>
+              <a:cs typeface="+mn-cs"/>
+            </a:endParaRPr>
+          </a:p>
+          <a:p>
+            <a:r>
+              <a:rPr lang="pl-PL" sz="1200" b="0" i="0" u="none" strike="noStrike" kern="1200" baseline="0" dirty="0">
+                <a:solidFill>
+                  <a:schemeClr val="tx1"/>
+                </a:solidFill>
+                <a:latin typeface="+mn-lt"/>
+                <a:ea typeface="+mn-ea"/>
+                <a:cs typeface="+mn-cs"/>
+              </a:rPr>
+              <a:t>The map() </a:t>
+            </a:r>
+            <a:r>
+              <a:rPr lang="pl-PL" sz="1200" b="0" i="0" u="none" strike="noStrike" kern="1200" baseline="0" dirty="0" err="1">
+                <a:solidFill>
+                  <a:schemeClr val="tx1"/>
+                </a:solidFill>
+                <a:latin typeface="+mn-lt"/>
+                <a:ea typeface="+mn-ea"/>
+                <a:cs typeface="+mn-cs"/>
+              </a:rPr>
+              <a:t>higher</a:t>
+            </a:r>
+            <a:r>
+              <a:rPr lang="pl-PL" sz="1200" b="0" i="0" u="none" strike="noStrike" kern="1200" baseline="0" dirty="0">
+                <a:solidFill>
+                  <a:schemeClr val="tx1"/>
+                </a:solidFill>
+                <a:latin typeface="+mn-lt"/>
+                <a:ea typeface="+mn-ea"/>
+                <a:cs typeface="+mn-cs"/>
+              </a:rPr>
+              <a:t>-order </a:t>
+            </a:r>
+            <a:r>
+              <a:rPr lang="pl-PL" sz="1200" b="0" i="0" u="none" strike="noStrike" kern="1200" baseline="0" dirty="0" err="1">
+                <a:solidFill>
+                  <a:schemeClr val="tx1"/>
+                </a:solidFill>
+                <a:latin typeface="+mn-lt"/>
+                <a:ea typeface="+mn-ea"/>
+                <a:cs typeface="+mn-cs"/>
+              </a:rPr>
+              <a:t>function</a:t>
+            </a:r>
+            <a:r>
+              <a:rPr lang="pl-PL" sz="1200" b="0" i="0" u="none" strike="noStrike" kern="1200" baseline="0" dirty="0">
+                <a:solidFill>
+                  <a:schemeClr val="tx1"/>
+                </a:solidFill>
+                <a:latin typeface="+mn-lt"/>
+                <a:ea typeface="+mn-ea"/>
+                <a:cs typeface="+mn-cs"/>
+              </a:rPr>
+              <a:t> </a:t>
+            </a:r>
+            <a:r>
+              <a:rPr lang="en-US" sz="1200" b="0" i="0" u="none" strike="noStrike" kern="1200" baseline="0" dirty="0">
+                <a:solidFill>
+                  <a:schemeClr val="tx1"/>
+                </a:solidFill>
+                <a:latin typeface="+mn-lt"/>
+                <a:ea typeface="+mn-ea"/>
+                <a:cs typeface="+mn-cs"/>
+              </a:rPr>
+              <a:t>takes a function parameter and uses it to convert one or more items to a new value</a:t>
+            </a:r>
+          </a:p>
+          <a:p>
+            <a:r>
+              <a:rPr lang="en-US" sz="1200" b="0" i="0" u="none" strike="noStrike" kern="1200" baseline="0" dirty="0">
+                <a:solidFill>
+                  <a:schemeClr val="tx1"/>
+                </a:solidFill>
+                <a:latin typeface="+mn-lt"/>
+                <a:ea typeface="+mn-ea"/>
+                <a:cs typeface="+mn-cs"/>
+              </a:rPr>
+              <a:t>and/or type. </a:t>
+            </a:r>
+            <a:endParaRPr lang="pl-PL" sz="1200" b="0" i="0" u="none" strike="noStrike" kern="1200" baseline="0" dirty="0">
+              <a:solidFill>
+                <a:schemeClr val="tx1"/>
+              </a:solidFill>
+              <a:latin typeface="+mn-lt"/>
+              <a:ea typeface="+mn-ea"/>
+              <a:cs typeface="+mn-cs"/>
+            </a:endParaRPr>
+          </a:p>
+          <a:p>
+            <a:r>
+              <a:rPr lang="en-US" sz="1200" b="0" i="0" u="none" strike="noStrike" kern="1200" baseline="0" dirty="0">
+                <a:solidFill>
+                  <a:schemeClr val="tx1"/>
+                </a:solidFill>
+                <a:latin typeface="+mn-lt"/>
+                <a:ea typeface="+mn-ea"/>
+                <a:cs typeface="+mn-cs"/>
+              </a:rPr>
+              <a:t>The reduce() higher-order function takes a function parameter and uses</a:t>
+            </a:r>
+            <a:r>
+              <a:rPr lang="pl-PL" sz="1200" b="0" i="0" u="none" strike="noStrike" kern="1200" baseline="0" dirty="0">
+                <a:solidFill>
+                  <a:schemeClr val="tx1"/>
+                </a:solidFill>
+                <a:latin typeface="+mn-lt"/>
+                <a:ea typeface="+mn-ea"/>
+                <a:cs typeface="+mn-cs"/>
+              </a:rPr>
+              <a:t> </a:t>
+            </a:r>
+            <a:r>
+              <a:rPr lang="en-US" sz="1200" b="0" i="0" u="none" strike="noStrike" kern="1200" baseline="0" dirty="0">
+                <a:solidFill>
+                  <a:schemeClr val="tx1"/>
+                </a:solidFill>
+                <a:latin typeface="+mn-lt"/>
+                <a:ea typeface="+mn-ea"/>
+                <a:cs typeface="+mn-cs"/>
+              </a:rPr>
+              <a:t>it to reduce a collection of multiple items down to a single item.</a:t>
+            </a:r>
+            <a:endParaRPr lang="pl-PL" sz="1200" b="0" i="0" u="none" strike="noStrike" kern="1200" baseline="0" dirty="0">
+              <a:solidFill>
+                <a:schemeClr val="tx1"/>
+              </a:solidFill>
+              <a:latin typeface="+mn-lt"/>
+              <a:ea typeface="+mn-ea"/>
+              <a:cs typeface="+mn-cs"/>
+            </a:endParaRPr>
+          </a:p>
+          <a:p>
+            <a:endParaRPr lang="pl-PL" sz="1200" b="0" i="0" u="none" strike="noStrike" kern="1200" baseline="0" dirty="0">
+              <a:solidFill>
+                <a:schemeClr val="tx1"/>
+              </a:solidFill>
+              <a:latin typeface="+mn-lt"/>
+              <a:ea typeface="+mn-ea"/>
+              <a:cs typeface="+mn-cs"/>
+            </a:endParaRPr>
+          </a:p>
+          <a:p>
+            <a:r>
+              <a:rPr lang="en-US" sz="1200" b="0" i="0" u="none" strike="noStrike" kern="1200" baseline="0" dirty="0">
+                <a:solidFill>
+                  <a:schemeClr val="tx1"/>
+                </a:solidFill>
+                <a:latin typeface="+mn-lt"/>
+                <a:ea typeface="+mn-ea"/>
+                <a:cs typeface="+mn-cs"/>
+              </a:rPr>
+              <a:t>The popular Map/Reduce computing paradigm uses this concept to tackle large computing challenges, by</a:t>
+            </a:r>
+          </a:p>
+          <a:p>
+            <a:r>
+              <a:rPr lang="en-US" sz="1200" b="0" i="0" u="none" strike="noStrike" kern="1200" baseline="0" dirty="0">
+                <a:solidFill>
+                  <a:schemeClr val="tx1"/>
+                </a:solidFill>
+                <a:latin typeface="+mn-lt"/>
+                <a:ea typeface="+mn-ea"/>
+                <a:cs typeface="+mn-cs"/>
+              </a:rPr>
+              <a:t>mapping the computation across a range of distributed nodes and reducing their results</a:t>
+            </a:r>
+            <a:r>
+              <a:rPr lang="pl-PL" sz="1200" b="0" i="0" u="none" strike="noStrike" kern="1200" baseline="0" dirty="0">
+                <a:solidFill>
+                  <a:schemeClr val="tx1"/>
+                </a:solidFill>
+                <a:latin typeface="+mn-lt"/>
+                <a:ea typeface="+mn-ea"/>
+                <a:cs typeface="+mn-cs"/>
+              </a:rPr>
+              <a:t> </a:t>
+            </a:r>
+            <a:r>
+              <a:rPr lang="en-US" sz="1200" b="0" i="0" u="none" strike="noStrike" kern="1200" baseline="0" dirty="0">
+                <a:solidFill>
+                  <a:schemeClr val="tx1"/>
+                </a:solidFill>
+                <a:latin typeface="+mn-lt"/>
+                <a:ea typeface="+mn-ea"/>
+                <a:cs typeface="+mn-cs"/>
+              </a:rPr>
+              <a:t>back to a meaningful size.</a:t>
+            </a:r>
             <a:endParaRPr lang="pl-PL" dirty="0"/>
           </a:p>
         </p:txBody>
@@ -1959,7 +3120,7 @@
     </p:spTree>
     <p:extLst>
       <p:ext uri="{BB962C8B-B14F-4D97-AF65-F5344CB8AC3E}">
-        <p14:creationId xmlns:p14="http://schemas.microsoft.com/office/powerpoint/2010/main" val="2988260470"/>
+        <p14:creationId xmlns:p14="http://schemas.microsoft.com/office/powerpoint/2010/main" val="1359792266"/>
       </p:ext>
     </p:extLst>
   </p:cSld>
@@ -2020,7 +3181,7 @@
     </p:spTree>
     <p:extLst>
       <p:ext uri="{BB962C8B-B14F-4D97-AF65-F5344CB8AC3E}">
-        <p14:creationId xmlns:p14="http://schemas.microsoft.com/office/powerpoint/2010/main" val="3376764379"/>
+        <p14:creationId xmlns:p14="http://schemas.microsoft.com/office/powerpoint/2010/main" val="2988260470"/>
       </p:ext>
     </p:extLst>
   </p:cSld>
@@ -2081,7 +3242,7 @@
     </p:spTree>
     <p:extLst>
       <p:ext uri="{BB962C8B-B14F-4D97-AF65-F5344CB8AC3E}">
-        <p14:creationId xmlns:p14="http://schemas.microsoft.com/office/powerpoint/2010/main" val="204777013"/>
+        <p14:creationId xmlns:p14="http://schemas.microsoft.com/office/powerpoint/2010/main" val="3376764379"/>
       </p:ext>
     </p:extLst>
   </p:cSld>
@@ -2142,7 +3303,7 @@
     </p:spTree>
     <p:extLst>
       <p:ext uri="{BB962C8B-B14F-4D97-AF65-F5344CB8AC3E}">
-        <p14:creationId xmlns:p14="http://schemas.microsoft.com/office/powerpoint/2010/main" val="1578492328"/>
+        <p14:creationId xmlns:p14="http://schemas.microsoft.com/office/powerpoint/2010/main" val="204777013"/>
       </p:ext>
     </p:extLst>
   </p:cSld>
@@ -2231,6 +3392,67 @@
     <p:extLst>
       <p:ext uri="{BB962C8B-B14F-4D97-AF65-F5344CB8AC3E}">
         <p14:creationId xmlns:p14="http://schemas.microsoft.com/office/powerpoint/2010/main" val="1451485858"/>
+      </p:ext>
+    </p:extLst>
+  </p:cSld>
+  <p:clrMapOvr>
+    <a:masterClrMapping/>
+  </p:clrMapOvr>
+</p:notes>
+</file>
+
+<file path=ppt/notesSlides/notesSlide20.xml><?xml version="1.0" encoding="utf-8"?>
+<p:notes xmlns:a="http://schemas.openxmlformats.org/drawingml/2006/main" xmlns:r="http://schemas.openxmlformats.org/officeDocument/2006/relationships" xmlns:p="http://schemas.openxmlformats.org/presentationml/2006/main">
+  <p:cSld>
+    <p:spTree>
+      <p:nvGrpSpPr>
+        <p:cNvPr id="1" name=""/>
+        <p:cNvGrpSpPr/>
+        <p:nvPr/>
+      </p:nvGrpSpPr>
+      <p:grpSpPr>
+        <a:xfrm>
+          <a:off x="0" y="0"/>
+          <a:ext cx="0" cy="0"/>
+          <a:chOff x="0" y="0"/>
+          <a:chExt cx="0" cy="0"/>
+        </a:xfrm>
+      </p:grpSpPr>
+      <p:sp>
+        <p:nvSpPr>
+          <p:cNvPr id="2" name="Slide Image Placeholder 1"/>
+          <p:cNvSpPr>
+            <a:spLocks noGrp="1" noRot="1" noChangeAspect="1"/>
+          </p:cNvSpPr>
+          <p:nvPr>
+            <p:ph type="sldImg"/>
+          </p:nvPr>
+        </p:nvSpPr>
+        <p:spPr/>
+      </p:sp>
+      <p:sp>
+        <p:nvSpPr>
+          <p:cNvPr id="3" name="Notes Placeholder 2"/>
+          <p:cNvSpPr>
+            <a:spLocks noGrp="1"/>
+          </p:cNvSpPr>
+          <p:nvPr>
+            <p:ph type="body" idx="1"/>
+          </p:nvPr>
+        </p:nvSpPr>
+        <p:spPr/>
+        <p:txBody>
+          <a:bodyPr/>
+          <a:lstStyle/>
+          <a:p>
+            <a:endParaRPr lang="pl-PL" dirty="0"/>
+          </a:p>
+        </p:txBody>
+      </p:sp>
+    </p:spTree>
+    <p:extLst>
+      <p:ext uri="{BB962C8B-B14F-4D97-AF65-F5344CB8AC3E}">
+        <p14:creationId xmlns:p14="http://schemas.microsoft.com/office/powerpoint/2010/main" val="1578492328"/>
       </p:ext>
     </p:extLst>
   </p:cSld>
@@ -2731,38 +3953,484 @@
           <a:lstStyle/>
           <a:p>
             <a:r>
-              <a:rPr lang="pl-PL" dirty="0"/>
-              <a:t>Driver proces jest odpowiedziany za wykonanie naszego programu na wszystkich </a:t>
-            </a:r>
-            <a:r>
-              <a:rPr lang="pl-PL" dirty="0" err="1"/>
-              <a:t>executorach</a:t>
-            </a:r>
-            <a:r>
-              <a:rPr lang="pl-PL" dirty="0"/>
-              <a:t>. W tym celu wykorzystuje </a:t>
-            </a:r>
-            <a:r>
-              <a:rPr lang="pl-PL" dirty="0" err="1"/>
-              <a:t>cluster</a:t>
-            </a:r>
-            <a:r>
-              <a:rPr lang="pl-PL" dirty="0"/>
-              <a:t> managera aby wiedzieć które zasoby są dostępne.</a:t>
-            </a:r>
-          </a:p>
-          <a:p>
-            <a:r>
-              <a:rPr lang="pl-PL" dirty="0"/>
-              <a:t>Cluster managerem może być np. YARN, MESOS czy KUBERNETES.</a:t>
-            </a:r>
+              <a:rPr lang="pl-PL" sz="1200" b="0" i="0" u="none" strike="noStrike" kern="1200" baseline="0" dirty="0">
+                <a:solidFill>
+                  <a:schemeClr val="tx1"/>
+                </a:solidFill>
+                <a:latin typeface="+mn-lt"/>
+                <a:ea typeface="+mn-ea"/>
+                <a:cs typeface="+mn-cs"/>
+              </a:rPr>
+              <a:t>Spark zbudowany jest z kilku mocno zintegrowanych komponentów. Na samym spodzie mamy Spark </a:t>
+            </a:r>
+            <a:r>
+              <a:rPr lang="pl-PL" sz="1200" b="0" i="0" u="none" strike="noStrike" kern="1200" baseline="0" dirty="0" err="1">
+                <a:solidFill>
+                  <a:schemeClr val="tx1"/>
+                </a:solidFill>
+                <a:latin typeface="+mn-lt"/>
+                <a:ea typeface="+mn-ea"/>
+                <a:cs typeface="+mn-cs"/>
+              </a:rPr>
+              <a:t>Core</a:t>
+            </a:r>
+            <a:r>
+              <a:rPr lang="pl-PL" sz="1200" b="0" i="0" u="none" strike="noStrike" kern="1200" baseline="0" dirty="0">
+                <a:solidFill>
+                  <a:schemeClr val="tx1"/>
+                </a:solidFill>
+                <a:latin typeface="+mn-lt"/>
+                <a:ea typeface="+mn-ea"/>
+                <a:cs typeface="+mn-cs"/>
+              </a:rPr>
+              <a:t>, odpowiedzialny za </a:t>
+            </a:r>
+            <a:r>
+              <a:rPr lang="pl-PL" sz="1200" b="0" i="0" u="none" strike="noStrike" kern="1200" baseline="0" dirty="0" err="1">
+                <a:solidFill>
+                  <a:schemeClr val="tx1"/>
+                </a:solidFill>
+                <a:latin typeface="+mn-lt"/>
+                <a:ea typeface="+mn-ea"/>
+                <a:cs typeface="+mn-cs"/>
+              </a:rPr>
+              <a:t>shedulling</a:t>
+            </a:r>
+            <a:r>
+              <a:rPr lang="pl-PL" sz="1200" b="0" i="0" u="none" strike="noStrike" kern="1200" baseline="0" dirty="0">
+                <a:solidFill>
+                  <a:schemeClr val="tx1"/>
+                </a:solidFill>
+                <a:latin typeface="+mn-lt"/>
+                <a:ea typeface="+mn-ea"/>
+                <a:cs typeface="+mn-cs"/>
+              </a:rPr>
+              <a:t> i dystrybucje operacji na rozproszonym środowisku, jakimi jest klaster.</a:t>
+            </a:r>
+          </a:p>
+          <a:p>
+            <a:r>
+              <a:rPr lang="pl-PL" sz="1200" b="0" i="0" u="none" strike="noStrike" kern="1200" baseline="0" dirty="0">
+                <a:solidFill>
+                  <a:schemeClr val="tx1"/>
+                </a:solidFill>
+                <a:latin typeface="+mn-lt"/>
+                <a:ea typeface="+mn-ea"/>
+                <a:cs typeface="+mn-cs"/>
+              </a:rPr>
+              <a:t>Sama idea budowy </a:t>
+            </a:r>
+            <a:r>
+              <a:rPr lang="pl-PL" sz="1200" b="0" i="0" u="none" strike="noStrike" kern="1200" baseline="0" dirty="0" err="1">
+                <a:solidFill>
+                  <a:schemeClr val="tx1"/>
+                </a:solidFill>
+                <a:latin typeface="+mn-lt"/>
+                <a:ea typeface="+mn-ea"/>
+                <a:cs typeface="+mn-cs"/>
+              </a:rPr>
+              <a:t>frameworka</a:t>
+            </a:r>
+            <a:r>
+              <a:rPr lang="pl-PL" sz="1200" b="0" i="0" u="none" strike="noStrike" kern="1200" baseline="0" dirty="0">
+                <a:solidFill>
+                  <a:schemeClr val="tx1"/>
+                </a:solidFill>
+                <a:latin typeface="+mn-lt"/>
+                <a:ea typeface="+mn-ea"/>
+                <a:cs typeface="+mn-cs"/>
+              </a:rPr>
+              <a:t> i zależności między komponentami ma wiele zalet. </a:t>
+            </a:r>
+          </a:p>
+          <a:p>
+            <a:pPr marL="171450" indent="-171450">
+              <a:buFontTx/>
+              <a:buChar char="-"/>
+            </a:pPr>
+            <a:r>
+              <a:rPr lang="pl-PL" sz="1200" b="0" i="0" u="none" strike="noStrike" kern="1200" baseline="0" dirty="0">
+                <a:solidFill>
+                  <a:schemeClr val="tx1"/>
+                </a:solidFill>
+                <a:latin typeface="+mn-lt"/>
+                <a:ea typeface="+mn-ea"/>
+                <a:cs typeface="+mn-cs"/>
+              </a:rPr>
+              <a:t>Każda z bibliotek powyżej Spark </a:t>
+            </a:r>
+            <a:r>
+              <a:rPr lang="pl-PL" sz="1200" b="0" i="0" u="none" strike="noStrike" kern="1200" baseline="0" dirty="0" err="1">
+                <a:solidFill>
+                  <a:schemeClr val="tx1"/>
+                </a:solidFill>
+                <a:latin typeface="+mn-lt"/>
+                <a:ea typeface="+mn-ea"/>
+                <a:cs typeface="+mn-cs"/>
+              </a:rPr>
+              <a:t>Core</a:t>
+            </a:r>
+            <a:r>
+              <a:rPr lang="pl-PL" sz="1200" b="0" i="0" u="none" strike="noStrike" kern="1200" baseline="0" dirty="0">
+                <a:solidFill>
+                  <a:schemeClr val="tx1"/>
+                </a:solidFill>
+                <a:latin typeface="+mn-lt"/>
+                <a:ea typeface="+mn-ea"/>
+                <a:cs typeface="+mn-cs"/>
+              </a:rPr>
+              <a:t> otrzymuje korzyści z optymalizacji na niższym poziomie. Np. jeśli wprowadzana jest jakaś zmiana w Spark </a:t>
+            </a:r>
+            <a:r>
+              <a:rPr lang="pl-PL" sz="1200" b="0" i="0" u="none" strike="noStrike" kern="1200" baseline="0" dirty="0" err="1">
+                <a:solidFill>
+                  <a:schemeClr val="tx1"/>
+                </a:solidFill>
+                <a:latin typeface="+mn-lt"/>
+                <a:ea typeface="+mn-ea"/>
+                <a:cs typeface="+mn-cs"/>
+              </a:rPr>
+              <a:t>Core</a:t>
+            </a:r>
+            <a:r>
+              <a:rPr lang="pl-PL" sz="1200" b="0" i="0" u="none" strike="noStrike" kern="1200" baseline="0" dirty="0">
+                <a:solidFill>
+                  <a:schemeClr val="tx1"/>
+                </a:solidFill>
+                <a:latin typeface="+mn-lt"/>
+                <a:ea typeface="+mn-ea"/>
+                <a:cs typeface="+mn-cs"/>
+              </a:rPr>
+              <a:t>, Spark </a:t>
+            </a:r>
+            <a:r>
+              <a:rPr lang="pl-PL" sz="1200" b="0" i="0" u="none" strike="noStrike" kern="1200" baseline="0" dirty="0" err="1">
+                <a:solidFill>
+                  <a:schemeClr val="tx1"/>
+                </a:solidFill>
+                <a:latin typeface="+mn-lt"/>
+                <a:ea typeface="+mn-ea"/>
+                <a:cs typeface="+mn-cs"/>
+              </a:rPr>
+              <a:t>Steraming</a:t>
+            </a:r>
+            <a:r>
+              <a:rPr lang="pl-PL" sz="1200" b="0" i="0" u="none" strike="noStrike" kern="1200" baseline="0" dirty="0">
+                <a:solidFill>
+                  <a:schemeClr val="tx1"/>
+                </a:solidFill>
+                <a:latin typeface="+mn-lt"/>
+                <a:ea typeface="+mn-ea"/>
+                <a:cs typeface="+mn-cs"/>
+              </a:rPr>
+              <a:t> i ML automatycznie mogą ją wykorzystać.</a:t>
+            </a:r>
+          </a:p>
+          <a:p>
+            <a:pPr marL="171450" indent="-171450">
+              <a:buFontTx/>
+              <a:buChar char="-"/>
+            </a:pPr>
+            <a:r>
+              <a:rPr lang="pl-PL" sz="1200" b="0" i="0" u="none" strike="noStrike" kern="1200" baseline="0" dirty="0">
+                <a:solidFill>
+                  <a:schemeClr val="tx1"/>
+                </a:solidFill>
+                <a:latin typeface="+mn-lt"/>
+                <a:ea typeface="+mn-ea"/>
+                <a:cs typeface="+mn-cs"/>
+              </a:rPr>
+              <a:t>Koszty utrzymania jednego </a:t>
+            </a:r>
+            <a:r>
+              <a:rPr lang="pl-PL" sz="1200" b="0" i="0" u="none" strike="noStrike" kern="1200" baseline="0" dirty="0" err="1">
+                <a:solidFill>
+                  <a:schemeClr val="tx1"/>
+                </a:solidFill>
+                <a:latin typeface="+mn-lt"/>
+                <a:ea typeface="+mn-ea"/>
+                <a:cs typeface="+mn-cs"/>
+              </a:rPr>
+              <a:t>frameworka</a:t>
+            </a:r>
+            <a:r>
+              <a:rPr lang="pl-PL" sz="1200" b="0" i="0" u="none" strike="noStrike" kern="1200" baseline="0" dirty="0">
+                <a:solidFill>
+                  <a:schemeClr val="tx1"/>
+                </a:solidFill>
+                <a:latin typeface="+mn-lt"/>
+                <a:ea typeface="+mn-ea"/>
+                <a:cs typeface="+mn-cs"/>
+              </a:rPr>
+              <a:t> są znacznie niższe niż posiadanie dedykowanych </a:t>
+            </a:r>
+            <a:r>
+              <a:rPr lang="pl-PL" sz="1200" b="0" i="0" u="none" strike="noStrike" kern="1200" baseline="0" dirty="0" err="1">
+                <a:solidFill>
+                  <a:schemeClr val="tx1"/>
+                </a:solidFill>
+                <a:latin typeface="+mn-lt"/>
+                <a:ea typeface="+mn-ea"/>
+                <a:cs typeface="+mn-cs"/>
+              </a:rPr>
+              <a:t>frameworków</a:t>
+            </a:r>
+            <a:r>
+              <a:rPr lang="pl-PL" sz="1200" b="0" i="0" u="none" strike="noStrike" kern="1200" baseline="0" dirty="0">
+                <a:solidFill>
+                  <a:schemeClr val="tx1"/>
+                </a:solidFill>
+                <a:latin typeface="+mn-lt"/>
+                <a:ea typeface="+mn-ea"/>
+                <a:cs typeface="+mn-cs"/>
+              </a:rPr>
+              <a:t> do </a:t>
+            </a:r>
+            <a:r>
+              <a:rPr lang="pl-PL" sz="1200" b="0" i="0" u="none" strike="noStrike" kern="1200" baseline="0" dirty="0" err="1">
+                <a:solidFill>
+                  <a:schemeClr val="tx1"/>
+                </a:solidFill>
+                <a:latin typeface="+mn-lt"/>
+                <a:ea typeface="+mn-ea"/>
+                <a:cs typeface="+mn-cs"/>
+              </a:rPr>
+              <a:t>stareamingu</a:t>
+            </a:r>
+            <a:r>
+              <a:rPr lang="pl-PL" sz="1200" b="0" i="0" u="none" strike="noStrike" kern="1200" baseline="0" dirty="0">
+                <a:solidFill>
+                  <a:schemeClr val="tx1"/>
+                </a:solidFill>
+                <a:latin typeface="+mn-lt"/>
+                <a:ea typeface="+mn-ea"/>
+                <a:cs typeface="+mn-cs"/>
+              </a:rPr>
+              <a:t>, ML, baz </a:t>
+            </a:r>
+            <a:r>
+              <a:rPr lang="pl-PL" sz="1200" b="0" i="0" u="none" strike="noStrike" kern="1200" baseline="0" dirty="0" err="1">
+                <a:solidFill>
+                  <a:schemeClr val="tx1"/>
+                </a:solidFill>
+                <a:latin typeface="+mn-lt"/>
+                <a:ea typeface="+mn-ea"/>
+                <a:cs typeface="+mn-cs"/>
+              </a:rPr>
+              <a:t>graphowych</a:t>
+            </a:r>
+            <a:r>
+              <a:rPr lang="pl-PL" sz="1200" b="0" i="0" u="none" strike="noStrike" kern="1200" baseline="0" dirty="0">
+                <a:solidFill>
+                  <a:schemeClr val="tx1"/>
+                </a:solidFill>
+                <a:latin typeface="+mn-lt"/>
+                <a:ea typeface="+mn-ea"/>
+                <a:cs typeface="+mn-cs"/>
+              </a:rPr>
+              <a:t>. Te koszty to nie tylko licencje i hardware, ale również </a:t>
+            </a:r>
+            <a:r>
+              <a:rPr lang="pl-PL" sz="1200" b="0" i="0" u="none" strike="noStrike" kern="1200" baseline="0" dirty="0" err="1">
+                <a:solidFill>
+                  <a:schemeClr val="tx1"/>
+                </a:solidFill>
+                <a:latin typeface="+mn-lt"/>
+                <a:ea typeface="+mn-ea"/>
+                <a:cs typeface="+mn-cs"/>
+              </a:rPr>
+              <a:t>maintenenace</a:t>
+            </a:r>
+            <a:r>
+              <a:rPr lang="pl-PL" sz="1200" b="0" i="0" u="none" strike="noStrike" kern="1200" baseline="0" dirty="0">
+                <a:solidFill>
+                  <a:schemeClr val="tx1"/>
+                </a:solidFill>
+                <a:latin typeface="+mn-lt"/>
+                <a:ea typeface="+mn-ea"/>
+                <a:cs typeface="+mn-cs"/>
+              </a:rPr>
+              <a:t>, deployment, </a:t>
+            </a:r>
+            <a:r>
+              <a:rPr lang="pl-PL" sz="1200" b="0" i="0" u="none" strike="noStrike" kern="1200" baseline="0" dirty="0" err="1">
+                <a:solidFill>
+                  <a:schemeClr val="tx1"/>
+                </a:solidFill>
+                <a:latin typeface="+mn-lt"/>
+                <a:ea typeface="+mn-ea"/>
+                <a:cs typeface="+mn-cs"/>
+              </a:rPr>
+              <a:t>tesowanie</a:t>
+            </a:r>
+            <a:r>
+              <a:rPr lang="pl-PL" sz="1200" b="0" i="0" u="none" strike="noStrike" kern="1200" baseline="0" dirty="0">
+                <a:solidFill>
+                  <a:schemeClr val="tx1"/>
+                </a:solidFill>
+                <a:latin typeface="+mn-lt"/>
+                <a:ea typeface="+mn-ea"/>
+                <a:cs typeface="+mn-cs"/>
+              </a:rPr>
+              <a:t>, support.</a:t>
+            </a:r>
+          </a:p>
+          <a:p>
+            <a:pPr marL="0" indent="0">
+              <a:buFontTx/>
+              <a:buNone/>
+            </a:pPr>
+            <a:r>
+              <a:rPr lang="pl-PL" sz="1200" b="0" i="0" u="none" strike="noStrike" kern="1200" baseline="0" dirty="0">
+                <a:solidFill>
+                  <a:schemeClr val="tx1"/>
+                </a:solidFill>
+                <a:latin typeface="+mn-lt"/>
+                <a:ea typeface="+mn-ea"/>
+                <a:cs typeface="+mn-cs"/>
+              </a:rPr>
+              <a:t>-  Możliwość budowy aplikacji łączących różne modele przetwarzania danych. Możemy mieć np. jedną aplikację, gdzie będziemy </a:t>
+            </a:r>
+            <a:r>
+              <a:rPr lang="pl-PL" sz="1200" b="0" i="0" u="none" strike="noStrike" kern="1200" baseline="0" dirty="0" err="1">
+                <a:solidFill>
+                  <a:schemeClr val="tx1"/>
+                </a:solidFill>
+                <a:latin typeface="+mn-lt"/>
+                <a:ea typeface="+mn-ea"/>
+                <a:cs typeface="+mn-cs"/>
+              </a:rPr>
+              <a:t>streamować</a:t>
+            </a:r>
+            <a:r>
+              <a:rPr lang="pl-PL" sz="1200" b="0" i="0" u="none" strike="noStrike" kern="1200" baseline="0" dirty="0">
+                <a:solidFill>
+                  <a:schemeClr val="tx1"/>
+                </a:solidFill>
+                <a:latin typeface="+mn-lt"/>
+                <a:ea typeface="+mn-ea"/>
+                <a:cs typeface="+mn-cs"/>
+              </a:rPr>
+              <a:t> dane, następnie w tym samym </a:t>
+            </a:r>
+            <a:r>
+              <a:rPr lang="pl-PL" sz="1200" b="0" i="0" u="none" strike="noStrike" kern="1200" baseline="0" dirty="0" err="1">
+                <a:solidFill>
+                  <a:schemeClr val="tx1"/>
+                </a:solidFill>
+                <a:latin typeface="+mn-lt"/>
+                <a:ea typeface="+mn-ea"/>
+                <a:cs typeface="+mn-cs"/>
+              </a:rPr>
+              <a:t>pipelinie</a:t>
+            </a:r>
+            <a:r>
+              <a:rPr lang="pl-PL" sz="1200" b="0" i="0" u="none" strike="noStrike" kern="1200" baseline="0" dirty="0">
+                <a:solidFill>
+                  <a:schemeClr val="tx1"/>
+                </a:solidFill>
+                <a:latin typeface="+mn-lt"/>
+                <a:ea typeface="+mn-ea"/>
+                <a:cs typeface="+mn-cs"/>
+              </a:rPr>
+              <a:t> użyć ML to klasyfikacji danych czy umożliwić data </a:t>
+            </a:r>
+            <a:r>
+              <a:rPr lang="pl-PL" sz="1200" b="0" i="0" u="none" strike="noStrike" kern="1200" baseline="0" dirty="0" err="1">
+                <a:solidFill>
+                  <a:schemeClr val="tx1"/>
+                </a:solidFill>
+                <a:latin typeface="+mn-lt"/>
+                <a:ea typeface="+mn-ea"/>
+                <a:cs typeface="+mn-cs"/>
+              </a:rPr>
+              <a:t>scientistom</a:t>
+            </a:r>
+            <a:r>
+              <a:rPr lang="pl-PL" sz="1200" b="0" i="0" u="none" strike="noStrike" kern="1200" baseline="0" dirty="0">
+                <a:solidFill>
+                  <a:schemeClr val="tx1"/>
+                </a:solidFill>
+                <a:latin typeface="+mn-lt"/>
+                <a:ea typeface="+mn-ea"/>
+                <a:cs typeface="+mn-cs"/>
+              </a:rPr>
+              <a:t> i analitykom danych pisanie SQL na danych płynących w naszym </a:t>
+            </a:r>
+            <a:r>
+              <a:rPr lang="pl-PL" sz="1200" b="0" i="0" u="none" strike="noStrike" kern="1200" baseline="0" dirty="0" err="1">
+                <a:solidFill>
+                  <a:schemeClr val="tx1"/>
+                </a:solidFill>
+                <a:latin typeface="+mn-lt"/>
+                <a:ea typeface="+mn-ea"/>
+                <a:cs typeface="+mn-cs"/>
+              </a:rPr>
+              <a:t>streamie</a:t>
+            </a:r>
+            <a:r>
+              <a:rPr lang="pl-PL" sz="1200" b="0" i="0" u="none" strike="noStrike" kern="1200" baseline="0" dirty="0">
+                <a:solidFill>
+                  <a:schemeClr val="tx1"/>
+                </a:solidFill>
+                <a:latin typeface="+mn-lt"/>
+                <a:ea typeface="+mn-ea"/>
+                <a:cs typeface="+mn-cs"/>
+              </a:rPr>
+              <a:t> w czasie rzeczywistym. Aplikacja może też przetwarzać w tym samym czasie dane </a:t>
+            </a:r>
+            <a:r>
+              <a:rPr lang="pl-PL" sz="1200" b="0" i="0" u="none" strike="noStrike" kern="1200" baseline="0" dirty="0" err="1">
+                <a:solidFill>
+                  <a:schemeClr val="tx1"/>
+                </a:solidFill>
+                <a:latin typeface="+mn-lt"/>
+                <a:ea typeface="+mn-ea"/>
+                <a:cs typeface="+mn-cs"/>
+              </a:rPr>
+              <a:t>batchowo</a:t>
+            </a:r>
+            <a:r>
+              <a:rPr lang="pl-PL" sz="1200" b="0" i="0" u="none" strike="noStrike" kern="1200" baseline="0" dirty="0">
+                <a:solidFill>
+                  <a:schemeClr val="tx1"/>
+                </a:solidFill>
+                <a:latin typeface="+mn-lt"/>
+                <a:ea typeface="+mn-ea"/>
+                <a:cs typeface="+mn-cs"/>
+              </a:rPr>
+              <a:t>, wg określonego kalendarza. </a:t>
+            </a:r>
+            <a:r>
+              <a:rPr lang="pl-PL" sz="1200" b="0" i="0" u="none" strike="noStrike" kern="1200" baseline="0" dirty="0" err="1">
+                <a:solidFill>
+                  <a:schemeClr val="tx1"/>
+                </a:solidFill>
+                <a:latin typeface="+mn-lt"/>
+                <a:ea typeface="+mn-ea"/>
+                <a:cs typeface="+mn-cs"/>
+              </a:rPr>
+              <a:t>Wszytsko</a:t>
+            </a:r>
+            <a:r>
+              <a:rPr lang="pl-PL" sz="1200" b="0" i="0" u="none" strike="noStrike" kern="1200" baseline="0" dirty="0">
+                <a:solidFill>
+                  <a:schemeClr val="tx1"/>
+                </a:solidFill>
+                <a:latin typeface="+mn-lt"/>
+                <a:ea typeface="+mn-ea"/>
+                <a:cs typeface="+mn-cs"/>
+              </a:rPr>
+              <a:t> to może być zaimplementowane w jednej aplikacji.</a:t>
+            </a:r>
+            <a:endParaRPr lang="pl-PL" dirty="0"/>
           </a:p>
         </p:txBody>
       </p:sp>
     </p:spTree>
     <p:extLst>
       <p:ext uri="{BB962C8B-B14F-4D97-AF65-F5344CB8AC3E}">
-        <p14:creationId xmlns:p14="http://schemas.microsoft.com/office/powerpoint/2010/main" val="3532789281"/>
+        <p14:creationId xmlns:p14="http://schemas.microsoft.com/office/powerpoint/2010/main" val="2187535379"/>
       </p:ext>
     </p:extLst>
   </p:cSld>
@@ -2817,12 +4485,8 @@
           <a:lstStyle/>
           <a:p>
             <a:r>
-              <a:rPr lang="pl-PL" dirty="0" err="1"/>
-              <a:t>HISpark</a:t>
-            </a:r>
-            <a:r>
-              <a:rPr lang="pl-PL" dirty="0"/>
-              <a:t> (jak każdy </a:t>
+              <a:rPr lang="pl-PL" dirty="0"/>
+              <a:t>Spark (jak każdy </a:t>
             </a:r>
             <a:r>
               <a:rPr lang="pl-PL" dirty="0" err="1"/>
@@ -2847,24 +4511,28 @@
               <a:buChar char="-"/>
             </a:pPr>
             <a:r>
-              <a:rPr lang="pl-PL" dirty="0"/>
+              <a:rPr lang="pl-PL" b="1" dirty="0"/>
               <a:t>RDD (</a:t>
             </a:r>
             <a:r>
-              <a:rPr lang="pl-PL" dirty="0" err="1"/>
+              <a:rPr lang="pl-PL" b="1" dirty="0" err="1"/>
               <a:t>Resilient</a:t>
             </a:r>
             <a:r>
-              <a:rPr lang="pl-PL" dirty="0"/>
+              <a:rPr lang="pl-PL" b="1" dirty="0"/>
               <a:t> Distributed </a:t>
             </a:r>
             <a:r>
-              <a:rPr lang="pl-PL" dirty="0" err="1"/>
+              <a:rPr lang="pl-PL" b="1" dirty="0" err="1"/>
               <a:t>Datasets</a:t>
             </a:r>
             <a:r>
-              <a:rPr lang="pl-PL" dirty="0"/>
-              <a:t>)– podstawowa abstrakcja Sparka w wersja od 1 do 2, bez względu jaki typ kolekcji użyjemy, ostatecznie Spark kompiluje do RDD.  RDD to </a:t>
+              <a:rPr lang="pl-PL" b="1" dirty="0"/>
+              <a:t>)– </a:t>
+            </a:r>
+            <a:r>
+              <a:rPr lang="pl-PL" dirty="0"/>
+              <a:t>podstawowa abstrakcja Sparka w wersja od 1 do 2, bez względu jaki typ kolekcji użyjemy, ostatecznie Spark kompiluje do RDD.  RDD to </a:t>
             </a:r>
             <a:r>
               <a:rPr lang="pl-PL" dirty="0" err="1"/>
@@ -2985,20 +4653,24 @@
               <a:buChar char="-"/>
             </a:pPr>
             <a:r>
-              <a:rPr lang="pl-PL" dirty="0" err="1"/>
+              <a:rPr lang="pl-PL" b="1" dirty="0" err="1"/>
               <a:t>Ditributet</a:t>
             </a:r>
             <a:r>
-              <a:rPr lang="pl-PL" dirty="0"/>
+              <a:rPr lang="pl-PL" b="1" dirty="0"/>
               <a:t> </a:t>
             </a:r>
             <a:r>
-              <a:rPr lang="pl-PL" dirty="0" err="1"/>
+              <a:rPr lang="pl-PL" b="1" dirty="0" err="1"/>
               <a:t>values</a:t>
             </a:r>
             <a:r>
-              <a:rPr lang="pl-PL" dirty="0"/>
-              <a:t> (broadcast) – pozwala na </a:t>
+              <a:rPr lang="pl-PL" b="1" dirty="0"/>
+              <a:t> (broadcast) </a:t>
+            </a:r>
+            <a:r>
+              <a:rPr lang="pl-PL" dirty="0"/>
+              <a:t>– pozwala na </a:t>
             </a:r>
             <a:r>
               <a:rPr lang="pl-PL" dirty="0" err="1"/>
@@ -3087,7 +4759,7 @@
               <a:buChar char="-"/>
             </a:pPr>
             <a:r>
-              <a:rPr lang="pl-PL" dirty="0" err="1"/>
+              <a:rPr lang="pl-PL" b="1" dirty="0" err="1"/>
               <a:t>DataFramne</a:t>
             </a:r>
             <a:r>
@@ -3110,10 +4782,10 @@
             </a:pPr>
             <a:r>
               <a:rPr lang="pl-PL" dirty="0"/>
-              <a:t>- </a:t>
-            </a:r>
-            <a:r>
-              <a:rPr lang="pl-PL" dirty="0" err="1"/>
+              <a:t>-   </a:t>
+            </a:r>
+            <a:r>
+              <a:rPr lang="pl-PL" b="1" dirty="0" err="1"/>
               <a:t>Dataset</a:t>
             </a:r>
             <a:r>
@@ -3134,7 +4806,7 @@
             </a:r>
             <a:r>
               <a:rPr lang="pl-PL" dirty="0"/>
-              <a:t>. Zamiast </a:t>
+              <a:t>.</a:t>
             </a:r>
           </a:p>
         </p:txBody>
@@ -3198,114 +4870,29 @@
           <a:p>
             <a:r>
               <a:rPr lang="pl-PL" dirty="0"/>
-              <a:t>RDD oferuje 2 typy operacji: </a:t>
-            </a:r>
-            <a:r>
-              <a:rPr lang="pl-PL" dirty="0" err="1"/>
-              <a:t>tranformacje</a:t>
-            </a:r>
-            <a:r>
-              <a:rPr lang="pl-PL" dirty="0"/>
-              <a:t> i akcje.</a:t>
-            </a:r>
-          </a:p>
-          <a:p>
-            <a:r>
-              <a:rPr lang="pl-PL" dirty="0"/>
-              <a:t>Transformacje – ponieważ RDD jest </a:t>
-            </a:r>
-            <a:r>
-              <a:rPr lang="pl-PL" dirty="0" err="1"/>
-              <a:t>immutable</a:t>
-            </a:r>
-            <a:r>
-              <a:rPr lang="pl-PL" dirty="0"/>
-              <a:t> </a:t>
-            </a:r>
-            <a:r>
-              <a:rPr lang="pl-PL" dirty="0" err="1"/>
-              <a:t>kazda</a:t>
-            </a:r>
-            <a:r>
-              <a:rPr lang="pl-PL" dirty="0"/>
-              <a:t> transformacja tworzy nowe RDD z </a:t>
-            </a:r>
-            <a:r>
-              <a:rPr lang="pl-PL" dirty="0" err="1"/>
-              <a:t>poprzeniego</a:t>
-            </a:r>
-            <a:r>
-              <a:rPr lang="pl-PL" dirty="0"/>
-              <a:t>.</a:t>
-            </a:r>
-          </a:p>
-          <a:p>
-            <a:r>
-              <a:rPr lang="pl-PL" dirty="0"/>
-              <a:t>Akcje – wyliczają ostateczny </a:t>
-            </a:r>
-            <a:r>
-              <a:rPr lang="pl-PL" dirty="0" err="1"/>
-              <a:t>resultat</a:t>
-            </a:r>
-            <a:r>
-              <a:rPr lang="pl-PL" dirty="0"/>
-              <a:t> obliczeń zwracając go do </a:t>
-            </a:r>
-            <a:r>
-              <a:rPr lang="pl-PL" dirty="0" err="1"/>
-              <a:t>divera</a:t>
-            </a:r>
-            <a:r>
-              <a:rPr lang="pl-PL" dirty="0"/>
-              <a:t> bądź zapisują w </a:t>
-            </a:r>
-            <a:r>
-              <a:rPr lang="pl-PL" dirty="0" err="1"/>
-              <a:t>external</a:t>
-            </a:r>
-            <a:r>
-              <a:rPr lang="pl-PL" dirty="0"/>
-              <a:t> </a:t>
-            </a:r>
-            <a:r>
-              <a:rPr lang="pl-PL" dirty="0" err="1"/>
-              <a:t>storage</a:t>
-            </a:r>
-            <a:r>
-              <a:rPr lang="pl-PL" dirty="0"/>
-              <a:t> system.</a:t>
-            </a:r>
-          </a:p>
-          <a:p>
-            <a:endParaRPr lang="pl-PL" dirty="0"/>
-          </a:p>
-          <a:p>
-            <a:r>
-              <a:rPr lang="pl-PL" dirty="0"/>
-              <a:t>Transformacje są </a:t>
-            </a:r>
-            <a:r>
-              <a:rPr lang="pl-PL" dirty="0" err="1"/>
-              <a:t>lazy</a:t>
-            </a:r>
-            <a:r>
-              <a:rPr lang="pl-PL" dirty="0"/>
-              <a:t>! Oznacza, że Spark poczeka możliwe jak najdłużej do wykonania </a:t>
-            </a:r>
-            <a:r>
-              <a:rPr lang="pl-PL" dirty="0" err="1"/>
-              <a:t>transfotmacji</a:t>
-            </a:r>
-            <a:r>
-              <a:rPr lang="pl-PL" dirty="0"/>
-              <a:t>. Zostanie ona wywołana przez akcję.</a:t>
-            </a:r>
-          </a:p>
-          <a:p>
-            <a:r>
-              <a:rPr lang="pl-PL" dirty="0"/>
-              <a:t>Zaleta takiego podejścia jest taka, że Spark może zbudować sobie bardziej efektywny plan zapytania niż wynikałoby to z naszego kodu.</a:t>
+              <a:t>Driver proces jest odpowiedziany za wykonanie naszego programu na wszystkich </a:t>
+            </a:r>
+            <a:r>
+              <a:rPr lang="pl-PL" dirty="0" err="1"/>
+              <a:t>executorach</a:t>
+            </a:r>
+            <a:r>
+              <a:rPr lang="pl-PL" dirty="0"/>
+              <a:t>. W tym celu wykorzystuje </a:t>
+            </a:r>
+            <a:r>
+              <a:rPr lang="pl-PL" dirty="0" err="1"/>
+              <a:t>cluster</a:t>
+            </a:r>
+            <a:r>
+              <a:rPr lang="pl-PL" dirty="0"/>
+              <a:t> managera aby wiedzieć które zasoby są dostępne.</a:t>
+            </a:r>
+          </a:p>
+          <a:p>
+            <a:r>
+              <a:rPr lang="pl-PL" dirty="0"/>
+              <a:t>Cluster managerem może być np. YARN, MESOS czy KUBERNETES.</a:t>
             </a:r>
           </a:p>
         </p:txBody>
@@ -3313,7 +4900,7 @@
     </p:spTree>
     <p:extLst>
       <p:ext uri="{BB962C8B-B14F-4D97-AF65-F5344CB8AC3E}">
-        <p14:creationId xmlns:p14="http://schemas.microsoft.com/office/powerpoint/2010/main" val="1276424123"/>
+        <p14:creationId xmlns:p14="http://schemas.microsoft.com/office/powerpoint/2010/main" val="3532789281"/>
       </p:ext>
     </p:extLst>
   </p:cSld>
@@ -3367,14 +4954,116 @@
           <a:bodyPr/>
           <a:lstStyle/>
           <a:p>
+            <a:r>
+              <a:rPr lang="pl-PL" dirty="0"/>
+              <a:t>Spark oferuje 2 typy operacji na </a:t>
+            </a:r>
+            <a:r>
+              <a:rPr lang="pl-PL" dirty="0" err="1"/>
+              <a:t>dancyh</a:t>
+            </a:r>
+            <a:r>
+              <a:rPr lang="pl-PL" dirty="0"/>
+              <a:t>: </a:t>
+            </a:r>
+            <a:r>
+              <a:rPr lang="pl-PL" dirty="0" err="1"/>
+              <a:t>tranformacje</a:t>
+            </a:r>
+            <a:r>
+              <a:rPr lang="pl-PL" dirty="0"/>
+              <a:t> i akcje.</a:t>
+            </a:r>
+          </a:p>
+          <a:p>
+            <a:r>
+              <a:rPr lang="pl-PL" b="1" dirty="0"/>
+              <a:t>Transformacje</a:t>
+            </a:r>
+            <a:r>
+              <a:rPr lang="pl-PL" dirty="0"/>
+              <a:t> – ponieważ RDD jest </a:t>
+            </a:r>
+            <a:r>
+              <a:rPr lang="pl-PL" dirty="0" err="1"/>
+              <a:t>immutable</a:t>
+            </a:r>
+            <a:r>
+              <a:rPr lang="pl-PL" dirty="0"/>
+              <a:t> każda transformacja tworzy nowe RDD z poprzedniego.</a:t>
+            </a:r>
+          </a:p>
+          <a:p>
+            <a:r>
+              <a:rPr lang="pl-PL" b="1" dirty="0"/>
+              <a:t>Akcje</a:t>
+            </a:r>
+            <a:r>
+              <a:rPr lang="pl-PL" dirty="0"/>
+              <a:t> – wyliczają ostateczny rezultat obliczeń zwracając go do </a:t>
+            </a:r>
+            <a:r>
+              <a:rPr lang="pl-PL" dirty="0" err="1"/>
+              <a:t>divera</a:t>
+            </a:r>
+            <a:r>
+              <a:rPr lang="pl-PL" dirty="0"/>
+              <a:t> bądź zapisują w </a:t>
+            </a:r>
+            <a:r>
+              <a:rPr lang="pl-PL" dirty="0" err="1"/>
+              <a:t>external</a:t>
+            </a:r>
+            <a:r>
+              <a:rPr lang="pl-PL" dirty="0"/>
+              <a:t> </a:t>
+            </a:r>
+            <a:r>
+              <a:rPr lang="pl-PL" dirty="0" err="1"/>
+              <a:t>storage</a:t>
+            </a:r>
+            <a:r>
+              <a:rPr lang="pl-PL" dirty="0"/>
+              <a:t> system.</a:t>
+            </a:r>
+          </a:p>
+          <a:p>
             <a:endParaRPr lang="pl-PL" dirty="0"/>
+          </a:p>
+          <a:p>
+            <a:r>
+              <a:rPr lang="pl-PL" dirty="0"/>
+              <a:t>Transformacje są </a:t>
+            </a:r>
+            <a:r>
+              <a:rPr lang="pl-PL" b="1" dirty="0" err="1"/>
+              <a:t>lazy</a:t>
+            </a:r>
+            <a:r>
+              <a:rPr lang="pl-PL" dirty="0"/>
+              <a:t>! Oznacza, że Spark poczeka możliwe jak najdłużej do wykonania </a:t>
+            </a:r>
+            <a:r>
+              <a:rPr lang="pl-PL" dirty="0" err="1"/>
+              <a:t>transfotmacji</a:t>
+            </a:r>
+            <a:r>
+              <a:rPr lang="pl-PL" dirty="0"/>
+              <a:t>. Zostanie ona wywołana przez akcję.</a:t>
+            </a:r>
+          </a:p>
+          <a:p>
+            <a:r>
+              <a:rPr lang="pl-PL" dirty="0"/>
+              <a:t>Zaleta takiego podejścia jest taka, że Spark może zbudować sobie bardziej efektywny plan zapytania niż wynikałoby to z naszego kodu.</a:t>
+            </a:r>
           </a:p>
         </p:txBody>
       </p:sp>
     </p:spTree>
     <p:extLst>
       <p:ext uri="{BB962C8B-B14F-4D97-AF65-F5344CB8AC3E}">
-        <p14:creationId xmlns:p14="http://schemas.microsoft.com/office/powerpoint/2010/main" val="4043919891"/>
+        <p14:creationId xmlns:p14="http://schemas.microsoft.com/office/powerpoint/2010/main" val="1276424123"/>
       </p:ext>
     </p:extLst>
   </p:cSld>
@@ -6775,11 +8464,7 @@
             </a:br>
             <a:r>
               <a:rPr lang="pl-PL" dirty="0"/>
-              <a:t>Apache Spark </a:t>
-            </a:r>
-            <a:r>
-              <a:rPr lang="pl-PL" dirty="0" err="1"/>
-              <a:t>APIs</a:t>
+              <a:t>Apache Spark Architecture</a:t>
             </a:r>
             <a:endParaRPr lang="en-US" dirty="0"/>
           </a:p>
@@ -6895,10 +8580,10 @@
       </p:sp>
       <p:pic>
         <p:nvPicPr>
-          <p:cNvPr id="8" name="Picture 7">
+          <p:cNvPr id="6" name="Picture 5">
             <a:extLst>
               <a:ext uri="{FF2B5EF4-FFF2-40B4-BE49-F238E27FC236}">
-                <a16:creationId xmlns:a16="http://schemas.microsoft.com/office/drawing/2014/main" id="{AE13E914-2E72-4257-A276-A23EC8662AFE}"/>
+                <a16:creationId xmlns:a16="http://schemas.microsoft.com/office/drawing/2014/main" id="{E56C735E-26BD-4FF5-92B6-016E4ACB8DB5}"/>
               </a:ext>
             </a:extLst>
           </p:cNvPr>
@@ -6915,8 +8600,8 @@
         </p:blipFill>
         <p:spPr>
           <a:xfrm>
-            <a:off x="1999210" y="987574"/>
-            <a:ext cx="5145580" cy="3468502"/>
+            <a:off x="1619672" y="926072"/>
+            <a:ext cx="5602965" cy="3592377"/>
           </a:xfrm>
           <a:prstGeom prst="rect">
             <a:avLst/>
@@ -6926,7 +8611,7 @@
     </p:spTree>
     <p:extLst>
       <p:ext uri="{BB962C8B-B14F-4D97-AF65-F5344CB8AC3E}">
-        <p14:creationId xmlns:p14="http://schemas.microsoft.com/office/powerpoint/2010/main" val="2390931764"/>
+        <p14:creationId xmlns:p14="http://schemas.microsoft.com/office/powerpoint/2010/main" val="1727686954"/>
       </p:ext>
     </p:extLst>
   </p:cSld>
@@ -7951,6 +9636,14 @@
               <a:rPr lang="pl-PL" sz="2000" dirty="0" err="1"/>
               <a:t>safety</a:t>
             </a:r>
+            <a:r>
+              <a:rPr lang="pl-PL" sz="2000" dirty="0"/>
+              <a:t> and </a:t>
+            </a:r>
+            <a:r>
+              <a:rPr lang="pl-PL" sz="2000" dirty="0" err="1"/>
+              <a:t>inference</a:t>
+            </a:r>
             <a:endParaRPr lang="pl-PL" sz="2000" dirty="0"/>
           </a:p>
           <a:p>
@@ -8771,17 +10464,15 @@
               <a:rPr lang="pl-PL" sz="2000" dirty="0" err="1"/>
               <a:t>variables</a:t>
             </a:r>
+            <a:r>
+              <a:rPr lang="pl-PL" sz="2000" dirty="0"/>
+              <a:t> and </a:t>
+            </a:r>
+            <a:r>
+              <a:rPr lang="pl-PL" sz="2000" dirty="0" err="1"/>
+              <a:t>tuples</a:t>
+            </a:r>
             <a:endParaRPr lang="pl-PL" sz="2000" dirty="0"/>
-          </a:p>
-          <a:p>
-            <a:r>
-              <a:rPr lang="pl-PL" sz="2000" dirty="0" err="1"/>
-              <a:t>Tuples</a:t>
-            </a:r>
-            <a:r>
-              <a:rPr lang="pl-PL" sz="2000" dirty="0"/>
-              <a:t> </a:t>
-            </a:r>
           </a:p>
           <a:p>
             <a:r>
@@ -9211,6 +10902,25 @@
           <a:p>
             <a:r>
               <a:rPr lang="pl-PL" sz="2000" dirty="0"/>
+              <a:t>Companion </a:t>
+            </a:r>
+            <a:r>
+              <a:rPr lang="pl-PL" sz="2000" dirty="0" err="1"/>
+              <a:t>object</a:t>
+            </a:r>
+            <a:r>
+              <a:rPr lang="pl-PL" sz="2000" dirty="0"/>
+              <a:t> out of the </a:t>
+            </a:r>
+            <a:r>
+              <a:rPr lang="pl-PL" sz="2000" dirty="0" err="1"/>
+              <a:t>box</a:t>
+            </a:r>
+            <a:endParaRPr lang="pl-PL" sz="2000" dirty="0"/>
+          </a:p>
+          <a:p>
+            <a:r>
+              <a:rPr lang="pl-PL" sz="2000" dirty="0"/>
               <a:t>I</a:t>
             </a:r>
             <a:r>
@@ -9251,37 +10961,6 @@
           </a:p>
           <a:p>
             <a:r>
-              <a:rPr lang="pl-PL" sz="2000" dirty="0" err="1">
-                <a:highlight>
-                  <a:srgbClr val="FFFF00"/>
-                </a:highlight>
-              </a:rPr>
-              <a:t>Immutable</a:t>
-            </a:r>
-            <a:r>
-              <a:rPr lang="pl-PL" sz="2000" dirty="0">
-                <a:highlight>
-                  <a:srgbClr val="FFFF00"/>
-                </a:highlight>
-              </a:rPr>
-              <a:t> out of the </a:t>
-            </a:r>
-            <a:r>
-              <a:rPr lang="pl-PL" sz="2000" dirty="0" err="1">
-                <a:highlight>
-                  <a:srgbClr val="FFFF00"/>
-                </a:highlight>
-              </a:rPr>
-              <a:t>box</a:t>
-            </a:r>
-            <a:endParaRPr lang="pl-PL" sz="2000" dirty="0">
-              <a:highlight>
-                <a:srgbClr val="FFFF00"/>
-              </a:highlight>
-            </a:endParaRPr>
-          </a:p>
-          <a:p>
-            <a:r>
               <a:rPr lang="pl-PL" sz="2000" dirty="0"/>
               <a:t>Perfect for </a:t>
             </a:r>
@@ -9318,7 +10997,7 @@
             </a:r>
             <a:r>
               <a:rPr lang="pl-PL" sz="2000" dirty="0" err="1"/>
-              <a:t>DataSet</a:t>
+              <a:t>Dataset</a:t>
             </a:r>
             <a:endParaRPr lang="pl-PL" sz="2000" dirty="0"/>
           </a:p>
@@ -9370,318 +11049,6 @@
               <a:solidFill>
                 <a:schemeClr val="tx1"/>
               </a:solidFill>
-            </a:endParaRPr>
-          </a:p>
-        </p:txBody>
-      </p:sp>
-      <p:sp>
-        <p:nvSpPr>
-          <p:cNvPr id="9" name="Rectangle 3">
-            <a:extLst>
-              <a:ext uri="{FF2B5EF4-FFF2-40B4-BE49-F238E27FC236}">
-                <a16:creationId xmlns:a16="http://schemas.microsoft.com/office/drawing/2014/main" id="{26CF9A5A-F107-4354-AF52-F3C9461448C8}"/>
-              </a:ext>
-            </a:extLst>
-          </p:cNvPr>
-          <p:cNvSpPr>
-            <a:spLocks noChangeArrowheads="1"/>
-          </p:cNvSpPr>
-          <p:nvPr/>
-        </p:nvSpPr>
-        <p:spPr bwMode="auto">
-          <a:xfrm>
-            <a:off x="734028" y="3928933"/>
-            <a:ext cx="7776790" cy="523220"/>
-          </a:xfrm>
-          <a:prstGeom prst="rect">
-            <a:avLst/>
-          </a:prstGeom>
-          <a:solidFill>
-            <a:srgbClr val="2B2B2B"/>
-          </a:solidFill>
-          <a:ln>
-            <a:noFill/>
-          </a:ln>
-          <a:effectLst/>
-          <a:extLst>
-            <a:ext uri="{91240B29-F687-4F45-9708-019B960494DF}">
-              <a14:hiddenLine xmlns:a14="http://schemas.microsoft.com/office/drawing/2010/main" w="9525">
-                <a:solidFill>
-                  <a:schemeClr val="tx1"/>
-                </a:solidFill>
-                <a:miter lim="800000"/>
-                <a:headEnd/>
-                <a:tailEnd/>
-              </a14:hiddenLine>
-            </a:ext>
-            <a:ext uri="{AF507438-7753-43E0-B8FC-AC1667EBCBE1}">
-              <a14:hiddenEffects xmlns:a14="http://schemas.microsoft.com/office/drawing/2010/main">
-                <a:effectLst>
-                  <a:outerShdw dist="35921" dir="2700000" algn="ctr" rotWithShape="0">
-                    <a:schemeClr val="bg2"/>
-                  </a:outerShdw>
-                </a:effectLst>
-              </a14:hiddenEffects>
-            </a:ext>
-          </a:extLst>
-        </p:spPr>
-        <p:txBody>
-          <a:bodyPr vert="horz" wrap="square" lIns="91440" tIns="45720" rIns="91440" bIns="45720" numCol="1" anchor="ctr" anchorCtr="0" compatLnSpc="1">
-            <a:prstTxWarp prst="textNoShape">
-              <a:avLst/>
-            </a:prstTxWarp>
-            <a:spAutoFit/>
-          </a:bodyPr>
-          <a:lstStyle/>
-          <a:p>
-            <a:pPr marL="0" marR="0" lvl="0" indent="0" algn="l" defTabSz="914400" rtl="0" eaLnBrk="0" fontAlgn="base" latinLnBrk="0" hangingPunct="0">
-              <a:lnSpc>
-                <a:spcPct val="100000"/>
-              </a:lnSpc>
-              <a:spcBef>
-                <a:spcPct val="0"/>
-              </a:spcBef>
-              <a:spcAft>
-                <a:spcPct val="0"/>
-              </a:spcAft>
-              <a:buClrTx/>
-              <a:buSzTx/>
-              <a:buFontTx/>
-              <a:buNone/>
-              <a:tabLst/>
-            </a:pPr>
-            <a:r>
-              <a:rPr kumimoji="0" lang="pl-PL" altLang="pl-PL" sz="1400" b="1" i="0" u="none" strike="noStrike" cap="none" normalizeH="0" baseline="0" dirty="0" err="1">
-                <a:ln>
-                  <a:noFill/>
-                </a:ln>
-                <a:solidFill>
-                  <a:srgbClr val="CC7832"/>
-                </a:solidFill>
-                <a:effectLst/>
-                <a:latin typeface="Courier New" panose="02070309020205020404" pitchFamily="49" charset="0"/>
-                <a:cs typeface="Courier New" panose="02070309020205020404" pitchFamily="49" charset="0"/>
-              </a:rPr>
-              <a:t>final</a:t>
-            </a:r>
-            <a:r>
-              <a:rPr kumimoji="0" lang="pl-PL" altLang="pl-PL" sz="1400" b="1" i="0" u="none" strike="noStrike" cap="none" normalizeH="0" baseline="0" dirty="0">
-                <a:ln>
-                  <a:noFill/>
-                </a:ln>
-                <a:solidFill>
-                  <a:srgbClr val="CC7832"/>
-                </a:solidFill>
-                <a:effectLst/>
-                <a:latin typeface="Courier New" panose="02070309020205020404" pitchFamily="49" charset="0"/>
-                <a:cs typeface="Courier New" panose="02070309020205020404" pitchFamily="49" charset="0"/>
-              </a:rPr>
-              <a:t> </a:t>
-            </a:r>
-            <a:r>
-              <a:rPr kumimoji="0" lang="pl-PL" altLang="pl-PL" sz="1400" b="1" i="0" u="none" strike="noStrike" cap="none" normalizeH="0" baseline="0" dirty="0" err="1">
-                <a:ln>
-                  <a:noFill/>
-                </a:ln>
-                <a:solidFill>
-                  <a:srgbClr val="CC7832"/>
-                </a:solidFill>
-                <a:effectLst/>
-                <a:latin typeface="Courier New" panose="02070309020205020404" pitchFamily="49" charset="0"/>
-                <a:cs typeface="Courier New" panose="02070309020205020404" pitchFamily="49" charset="0"/>
-              </a:rPr>
-              <a:t>case</a:t>
-            </a:r>
-            <a:r>
-              <a:rPr kumimoji="0" lang="pl-PL" altLang="pl-PL" sz="1400" b="1" i="0" u="none" strike="noStrike" cap="none" normalizeH="0" baseline="0" dirty="0">
-                <a:ln>
-                  <a:noFill/>
-                </a:ln>
-                <a:solidFill>
-                  <a:srgbClr val="CC7832"/>
-                </a:solidFill>
-                <a:effectLst/>
-                <a:latin typeface="Courier New" panose="02070309020205020404" pitchFamily="49" charset="0"/>
-                <a:cs typeface="Courier New" panose="02070309020205020404" pitchFamily="49" charset="0"/>
-              </a:rPr>
-              <a:t> </a:t>
-            </a:r>
-            <a:r>
-              <a:rPr kumimoji="0" lang="pl-PL" altLang="pl-PL" sz="1400" b="1" i="0" u="none" strike="noStrike" cap="none" normalizeH="0" baseline="0" dirty="0" err="1">
-                <a:ln>
-                  <a:noFill/>
-                </a:ln>
-                <a:solidFill>
-                  <a:srgbClr val="CC7832"/>
-                </a:solidFill>
-                <a:effectLst/>
-                <a:latin typeface="Courier New" panose="02070309020205020404" pitchFamily="49" charset="0"/>
-                <a:cs typeface="Courier New" panose="02070309020205020404" pitchFamily="49" charset="0"/>
-              </a:rPr>
-              <a:t>class</a:t>
-            </a:r>
-            <a:r>
-              <a:rPr kumimoji="0" lang="pl-PL" altLang="pl-PL" sz="1400" b="1" i="0" u="none" strike="noStrike" cap="none" normalizeH="0" baseline="0" dirty="0">
-                <a:ln>
-                  <a:noFill/>
-                </a:ln>
-                <a:solidFill>
-                  <a:srgbClr val="CC7832"/>
-                </a:solidFill>
-                <a:effectLst/>
-                <a:latin typeface="Courier New" panose="02070309020205020404" pitchFamily="49" charset="0"/>
-                <a:cs typeface="Courier New" panose="02070309020205020404" pitchFamily="49" charset="0"/>
-              </a:rPr>
-              <a:t> </a:t>
-            </a:r>
-            <a:r>
-              <a:rPr kumimoji="0" lang="pl-PL" altLang="pl-PL" sz="1400" b="0" i="0" u="none" strike="noStrike" cap="none" normalizeH="0" baseline="0" dirty="0" err="1">
-                <a:ln>
-                  <a:noFill/>
-                </a:ln>
-                <a:solidFill>
-                  <a:srgbClr val="A9B7C6"/>
-                </a:solidFill>
-                <a:effectLst/>
-                <a:latin typeface="Courier New" panose="02070309020205020404" pitchFamily="49" charset="0"/>
-                <a:cs typeface="Courier New" panose="02070309020205020404" pitchFamily="49" charset="0"/>
-              </a:rPr>
-              <a:t>Character</a:t>
-            </a:r>
-            <a:r>
-              <a:rPr kumimoji="0" lang="pl-PL" altLang="pl-PL" sz="1400" b="0" i="0" u="none" strike="noStrike" cap="none" normalizeH="0" baseline="0" dirty="0">
-                <a:ln>
-                  <a:noFill/>
-                </a:ln>
-                <a:solidFill>
-                  <a:srgbClr val="A9B7C6"/>
-                </a:solidFill>
-                <a:effectLst/>
-                <a:latin typeface="Courier New" panose="02070309020205020404" pitchFamily="49" charset="0"/>
-                <a:cs typeface="Courier New" panose="02070309020205020404" pitchFamily="49" charset="0"/>
-              </a:rPr>
-              <a:t>(Id: </a:t>
-            </a:r>
-            <a:r>
-              <a:rPr kumimoji="0" lang="pl-PL" altLang="pl-PL" sz="1400" b="0" i="0" u="none" strike="noStrike" cap="none" normalizeH="0" baseline="0" dirty="0">
-                <a:ln>
-                  <a:noFill/>
-                </a:ln>
-                <a:solidFill>
-                  <a:srgbClr val="4E807D"/>
-                </a:solidFill>
-                <a:effectLst/>
-                <a:latin typeface="Courier New" panose="02070309020205020404" pitchFamily="49" charset="0"/>
-                <a:cs typeface="Courier New" panose="02070309020205020404" pitchFamily="49" charset="0"/>
-              </a:rPr>
-              <a:t>String</a:t>
-            </a:r>
-            <a:r>
-              <a:rPr kumimoji="0" lang="pl-PL" altLang="pl-PL" sz="1400" b="0" i="0" u="none" strike="noStrike" cap="none" normalizeH="0" baseline="0" dirty="0">
-                <a:ln>
-                  <a:noFill/>
-                </a:ln>
-                <a:solidFill>
-                  <a:srgbClr val="CC7832"/>
-                </a:solidFill>
-                <a:effectLst/>
-                <a:latin typeface="Courier New" panose="02070309020205020404" pitchFamily="49" charset="0"/>
-                <a:cs typeface="Courier New" panose="02070309020205020404" pitchFamily="49" charset="0"/>
-              </a:rPr>
-              <a:t>, </a:t>
-            </a:r>
-            <a:r>
-              <a:rPr kumimoji="0" lang="pl-PL" altLang="pl-PL" sz="1400" b="0" i="0" u="none" strike="noStrike" cap="none" normalizeH="0" baseline="0" dirty="0" err="1">
-                <a:ln>
-                  <a:noFill/>
-                </a:ln>
-                <a:solidFill>
-                  <a:srgbClr val="A9B7C6"/>
-                </a:solidFill>
-                <a:effectLst/>
-                <a:latin typeface="Courier New" panose="02070309020205020404" pitchFamily="49" charset="0"/>
-                <a:cs typeface="Courier New" panose="02070309020205020404" pitchFamily="49" charset="0"/>
-              </a:rPr>
-              <a:t>PrimaryName</a:t>
-            </a:r>
-            <a:r>
-              <a:rPr kumimoji="0" lang="pl-PL" altLang="pl-PL" sz="1400" b="0" i="0" u="none" strike="noStrike" cap="none" normalizeH="0" baseline="0" dirty="0">
-                <a:ln>
-                  <a:noFill/>
-                </a:ln>
-                <a:solidFill>
-                  <a:srgbClr val="A9B7C6"/>
-                </a:solidFill>
-                <a:effectLst/>
-                <a:latin typeface="Courier New" panose="02070309020205020404" pitchFamily="49" charset="0"/>
-                <a:cs typeface="Courier New" panose="02070309020205020404" pitchFamily="49" charset="0"/>
-              </a:rPr>
-              <a:t>: </a:t>
-            </a:r>
-            <a:r>
-              <a:rPr kumimoji="0" lang="pl-PL" altLang="pl-PL" sz="1400" b="0" i="0" u="none" strike="noStrike" cap="none" normalizeH="0" baseline="0" dirty="0">
-                <a:ln>
-                  <a:noFill/>
-                </a:ln>
-                <a:solidFill>
-                  <a:srgbClr val="4E807D"/>
-                </a:solidFill>
-                <a:effectLst/>
-                <a:latin typeface="Courier New" panose="02070309020205020404" pitchFamily="49" charset="0"/>
-                <a:cs typeface="Courier New" panose="02070309020205020404" pitchFamily="49" charset="0"/>
-              </a:rPr>
-              <a:t>String</a:t>
-            </a:r>
-            <a:r>
-              <a:rPr kumimoji="0" lang="pl-PL" altLang="pl-PL" sz="1400" b="0" i="0" u="none" strike="noStrike" cap="none" normalizeH="0" baseline="0" dirty="0">
-                <a:ln>
-                  <a:noFill/>
-                </a:ln>
-                <a:solidFill>
-                  <a:srgbClr val="A9B7C6"/>
-                </a:solidFill>
-                <a:effectLst/>
-                <a:latin typeface="Courier New" panose="02070309020205020404" pitchFamily="49" charset="0"/>
-                <a:cs typeface="Courier New" panose="02070309020205020404" pitchFamily="49" charset="0"/>
-              </a:rPr>
-              <a:t>) {</a:t>
-            </a:r>
-            <a:br>
-              <a:rPr kumimoji="0" lang="pl-PL" altLang="pl-PL" sz="1400" b="0" i="0" u="none" strike="noStrike" cap="none" normalizeH="0" baseline="0" dirty="0">
-                <a:ln>
-                  <a:noFill/>
-                </a:ln>
-                <a:solidFill>
-                  <a:srgbClr val="A9B7C6"/>
-                </a:solidFill>
-                <a:effectLst/>
-                <a:latin typeface="Courier New" panose="02070309020205020404" pitchFamily="49" charset="0"/>
-                <a:cs typeface="Courier New" panose="02070309020205020404" pitchFamily="49" charset="0"/>
-              </a:rPr>
-            </a:br>
-            <a:r>
-              <a:rPr kumimoji="0" lang="pl-PL" altLang="pl-PL" sz="1400" b="0" i="0" u="none" strike="noStrike" cap="none" normalizeH="0" baseline="0" dirty="0">
-                <a:ln>
-                  <a:noFill/>
-                </a:ln>
-                <a:solidFill>
-                  <a:srgbClr val="A9B7C6"/>
-                </a:solidFill>
-                <a:effectLst/>
-                <a:latin typeface="Courier New" panose="02070309020205020404" pitchFamily="49" charset="0"/>
-                <a:cs typeface="Courier New" panose="02070309020205020404" pitchFamily="49" charset="0"/>
-              </a:rPr>
-              <a:t>}</a:t>
-            </a:r>
-            <a:endParaRPr kumimoji="0" lang="pl-PL" altLang="pl-PL" sz="3200" b="0" i="0" u="none" strike="noStrike" cap="none" normalizeH="0" baseline="0" dirty="0">
-              <a:ln>
-                <a:noFill/>
-              </a:ln>
-              <a:solidFill>
-                <a:schemeClr val="tx1"/>
-              </a:solidFill>
-              <a:effectLst/>
-              <a:latin typeface="Arial" panose="020B0604020202020204" pitchFamily="34" charset="0"/>
             </a:endParaRPr>
           </a:p>
         </p:txBody>
@@ -9742,15 +11109,7 @@
             </a:r>
             <a:r>
               <a:rPr lang="pl-PL" dirty="0" err="1"/>
-              <a:t>function</a:t>
-            </a:r>
-            <a:r>
-              <a:rPr lang="pl-PL" dirty="0"/>
-              <a:t> as a </a:t>
-            </a:r>
-            <a:r>
-              <a:rPr lang="pl-PL" dirty="0" err="1"/>
-              <a:t>first</a:t>
+              <a:t>Pattern</a:t>
             </a:r>
             <a:r>
               <a:rPr lang="pl-PL" dirty="0"/>
@@ -9758,15 +11117,7 @@
             </a:r>
             <a:r>
               <a:rPr lang="pl-PL" dirty="0" err="1"/>
-              <a:t>class</a:t>
-            </a:r>
-            <a:r>
-              <a:rPr lang="pl-PL" dirty="0"/>
-              <a:t> </a:t>
-            </a:r>
-            <a:r>
-              <a:rPr lang="pl-PL" dirty="0" err="1"/>
-              <a:t>citizien</a:t>
+              <a:t>matching</a:t>
             </a:r>
             <a:endParaRPr lang="en-US" dirty="0"/>
           </a:p>
@@ -10003,16 +11354,27 @@
           </a:lstStyle>
           <a:p>
             <a:r>
+              <a:rPr lang="pl-PL" sz="2000" dirty="0"/>
+              <a:t>„</a:t>
+            </a:r>
+            <a:r>
               <a:rPr lang="pl-PL" sz="2000" dirty="0" err="1"/>
-              <a:t>Pure</a:t>
+              <a:t>switch</a:t>
             </a:r>
             <a:r>
               <a:rPr lang="pl-PL" sz="2000" dirty="0"/>
-              <a:t> – no </a:t>
+              <a:t>” on </a:t>
             </a:r>
             <a:r>
               <a:rPr lang="pl-PL" sz="2000" dirty="0" err="1"/>
-              <a:t>side</a:t>
+              <a:t>steroids</a:t>
+            </a:r>
+            <a:endParaRPr lang="pl-PL" sz="2000" dirty="0"/>
+          </a:p>
+          <a:p>
+            <a:r>
+              <a:rPr lang="en-US" sz="2000" dirty="0"/>
+              <a:t>Match against class hierarchies, sequences, and</a:t>
             </a:r>
             <a:r>
               <a:rPr lang="pl-PL" sz="2000" dirty="0"/>
@@ -10020,18 +11382,7 @@
             </a:r>
             <a:r>
               <a:rPr lang="pl-PL" sz="2000" dirty="0" err="1"/>
-              <a:t>effects</a:t>
-            </a:r>
-            <a:endParaRPr lang="pl-PL" sz="2000" dirty="0"/>
-          </a:p>
-          <a:p>
-            <a:r>
-              <a:rPr lang="pl-PL" sz="2000" dirty="0"/>
-              <a:t>High-Order – </a:t>
-            </a:r>
-            <a:r>
-              <a:rPr lang="pl-PL" sz="2000" dirty="0" err="1"/>
-              <a:t>can</a:t>
+              <a:t>case</a:t>
             </a:r>
             <a:r>
               <a:rPr lang="pl-PL" sz="2000" dirty="0"/>
@@ -10039,15 +11390,14 @@
             </a:r>
             <a:r>
               <a:rPr lang="pl-PL" sz="2000" dirty="0" err="1"/>
-              <a:t>accpet</a:t>
-            </a:r>
-            <a:r>
-              <a:rPr lang="pl-PL" sz="2000" dirty="0"/>
-              <a:t> as a argument </a:t>
-            </a:r>
+              <a:t>classes</a:t>
+            </a:r>
+            <a:endParaRPr lang="pl-PL" sz="2000" dirty="0"/>
+          </a:p>
+          <a:p>
             <a:r>
               <a:rPr lang="pl-PL" sz="2000" dirty="0" err="1"/>
-              <a:t>or</a:t>
+              <a:t>Very</a:t>
             </a:r>
             <a:r>
               <a:rPr lang="pl-PL" sz="2000" dirty="0"/>
@@ -10055,37 +11405,6 @@
             </a:r>
             <a:r>
               <a:rPr lang="pl-PL" sz="2000" dirty="0" err="1"/>
-              <a:t>reurn</a:t>
-            </a:r>
-            <a:r>
-              <a:rPr lang="pl-PL" sz="2000" dirty="0"/>
-              <a:t> </a:t>
-            </a:r>
-            <a:r>
-              <a:rPr lang="pl-PL" sz="2000" dirty="0" err="1"/>
-              <a:t>another</a:t>
-            </a:r>
-            <a:r>
-              <a:rPr lang="pl-PL" sz="2000" dirty="0"/>
-              <a:t> </a:t>
-            </a:r>
-            <a:r>
-              <a:rPr lang="pl-PL" sz="2000" dirty="0" err="1"/>
-              <a:t>function</a:t>
-            </a:r>
-            <a:endParaRPr lang="pl-PL" sz="2000" dirty="0"/>
-          </a:p>
-          <a:p>
-            <a:r>
-              <a:rPr lang="pl-PL" sz="2000" dirty="0" err="1"/>
-              <a:t>Very</a:t>
-            </a:r>
-            <a:r>
-              <a:rPr lang="pl-PL" sz="2000" dirty="0"/>
-              <a:t> </a:t>
-            </a:r>
-            <a:r>
-              <a:rPr lang="pl-PL" sz="2000" dirty="0" err="1"/>
               <a:t>powerful</a:t>
             </a:r>
             <a:r>
@@ -10099,12 +11418,9 @@
             <a:endParaRPr lang="pl-PL" sz="2000" dirty="0"/>
           </a:p>
           <a:p>
-            <a:endParaRPr lang="pl-PL" sz="2000" dirty="0"/>
-          </a:p>
-          <a:p>
-            <a:endParaRPr lang="pl-PL" sz="2000" dirty="0"/>
-          </a:p>
-          <a:p>
+            <a:pPr marL="0" indent="0">
+              <a:buNone/>
+            </a:pPr>
             <a:endParaRPr lang="en-US" sz="2000" dirty="0"/>
           </a:p>
           <a:p>
@@ -10118,7 +11434,7 @@
     </p:spTree>
     <p:extLst>
       <p:ext uri="{BB962C8B-B14F-4D97-AF65-F5344CB8AC3E}">
-        <p14:creationId xmlns:p14="http://schemas.microsoft.com/office/powerpoint/2010/main" val="2199849601"/>
+        <p14:creationId xmlns:p14="http://schemas.microsoft.com/office/powerpoint/2010/main" val="3173888047"/>
       </p:ext>
     </p:extLst>
   </p:cSld>
@@ -10171,7 +11487,15 @@
             </a:r>
             <a:r>
               <a:rPr lang="pl-PL" dirty="0" err="1"/>
-              <a:t>Pattern</a:t>
+              <a:t>function</a:t>
+            </a:r>
+            <a:r>
+              <a:rPr lang="pl-PL" dirty="0"/>
+              <a:t> as a </a:t>
+            </a:r>
+            <a:r>
+              <a:rPr lang="pl-PL" dirty="0" err="1"/>
+              <a:t>first</a:t>
             </a:r>
             <a:r>
               <a:rPr lang="pl-PL" dirty="0"/>
@@ -10179,7 +11503,15 @@
             </a:r>
             <a:r>
               <a:rPr lang="pl-PL" dirty="0" err="1"/>
-              <a:t>matching</a:t>
+              <a:t>class</a:t>
+            </a:r>
+            <a:r>
+              <a:rPr lang="pl-PL" dirty="0"/>
+              <a:t> </a:t>
+            </a:r>
+            <a:r>
+              <a:rPr lang="pl-PL" dirty="0" err="1"/>
+              <a:t>citizien</a:t>
             </a:r>
             <a:endParaRPr lang="en-US" dirty="0"/>
           </a:p>
@@ -10416,27 +11748,16 @@
           </a:lstStyle>
           <a:p>
             <a:r>
+              <a:rPr lang="pl-PL" sz="2000" dirty="0" err="1"/>
+              <a:t>Pure</a:t>
+            </a:r>
+            <a:r>
               <a:rPr lang="pl-PL" sz="2000" dirty="0"/>
-              <a:t>„</a:t>
+              <a:t> – no </a:t>
             </a:r>
             <a:r>
               <a:rPr lang="pl-PL" sz="2000" dirty="0" err="1"/>
-              <a:t>switch</a:t>
-            </a:r>
-            <a:r>
-              <a:rPr lang="pl-PL" sz="2000" dirty="0"/>
-              <a:t>” on </a:t>
-            </a:r>
-            <a:r>
-              <a:rPr lang="pl-PL" sz="2000" dirty="0" err="1"/>
-              <a:t>steroids</a:t>
-            </a:r>
-            <a:endParaRPr lang="pl-PL" sz="2000" dirty="0"/>
-          </a:p>
-          <a:p>
-            <a:r>
-              <a:rPr lang="en-US" sz="2000" dirty="0"/>
-              <a:t>Match against class hierarchies, sequences, and</a:t>
+              <a:t>side</a:t>
             </a:r>
             <a:r>
               <a:rPr lang="pl-PL" sz="2000" dirty="0"/>
@@ -10444,7 +11765,18 @@
             </a:r>
             <a:r>
               <a:rPr lang="pl-PL" sz="2000" dirty="0" err="1"/>
-              <a:t>case</a:t>
+              <a:t>effects</a:t>
+            </a:r>
+            <a:endParaRPr lang="pl-PL" sz="2000" dirty="0"/>
+          </a:p>
+          <a:p>
+            <a:r>
+              <a:rPr lang="pl-PL" sz="2000" dirty="0"/>
+              <a:t>High-Order – </a:t>
+            </a:r>
+            <a:r>
+              <a:rPr lang="pl-PL" sz="2000" dirty="0" err="1"/>
+              <a:t>can</a:t>
             </a:r>
             <a:r>
               <a:rPr lang="pl-PL" sz="2000" dirty="0"/>
@@ -10452,7 +11784,39 @@
             </a:r>
             <a:r>
               <a:rPr lang="pl-PL" sz="2000" dirty="0" err="1"/>
-              <a:t>classes</a:t>
+              <a:t>accpet</a:t>
+            </a:r>
+            <a:r>
+              <a:rPr lang="pl-PL" sz="2000" dirty="0"/>
+              <a:t> as a argument </a:t>
+            </a:r>
+            <a:r>
+              <a:rPr lang="pl-PL" sz="2000" dirty="0" err="1"/>
+              <a:t>or</a:t>
+            </a:r>
+            <a:r>
+              <a:rPr lang="pl-PL" sz="2000" dirty="0"/>
+              <a:t> </a:t>
+            </a:r>
+            <a:r>
+              <a:rPr lang="pl-PL" sz="2000" dirty="0" err="1"/>
+              <a:t>reurn</a:t>
+            </a:r>
+            <a:r>
+              <a:rPr lang="pl-PL" sz="2000" dirty="0"/>
+              <a:t> </a:t>
+            </a:r>
+            <a:r>
+              <a:rPr lang="pl-PL" sz="2000" dirty="0" err="1"/>
+              <a:t>another</a:t>
+            </a:r>
+            <a:r>
+              <a:rPr lang="pl-PL" sz="2000" dirty="0"/>
+              <a:t> </a:t>
+            </a:r>
+            <a:r>
+              <a:rPr lang="pl-PL" sz="2000" dirty="0" err="1"/>
+              <a:t>function</a:t>
             </a:r>
             <a:endParaRPr lang="pl-PL" sz="2000" dirty="0"/>
           </a:p>
@@ -10483,147 +11847,7 @@
             <a:endParaRPr lang="pl-PL" sz="2000" dirty="0"/>
           </a:p>
           <a:p>
-            <a:pPr marL="0" indent="0">
-              <a:buNone/>
-            </a:pPr>
-            <a:r>
-              <a:rPr lang="pl-PL" sz="1800" dirty="0">
-                <a:latin typeface="Courier New" panose="02070309020205020404" pitchFamily="49" charset="0"/>
-                <a:cs typeface="Courier New" panose="02070309020205020404" pitchFamily="49" charset="0"/>
-              </a:rPr>
-              <a:t>&lt;</a:t>
-            </a:r>
-            <a:r>
-              <a:rPr lang="pl-PL" sz="1800" dirty="0" err="1">
-                <a:latin typeface="Courier New" panose="02070309020205020404" pitchFamily="49" charset="0"/>
-                <a:cs typeface="Courier New" panose="02070309020205020404" pitchFamily="49" charset="0"/>
-              </a:rPr>
-              <a:t>expression</a:t>
-            </a:r>
-            <a:r>
-              <a:rPr lang="pl-PL" sz="1800" dirty="0">
-                <a:latin typeface="Courier New" panose="02070309020205020404" pitchFamily="49" charset="0"/>
-                <a:cs typeface="Courier New" panose="02070309020205020404" pitchFamily="49" charset="0"/>
-              </a:rPr>
-              <a:t>&gt; </a:t>
-            </a:r>
-            <a:r>
-              <a:rPr lang="pl-PL" sz="1800" dirty="0" err="1">
-                <a:latin typeface="Courier New" panose="02070309020205020404" pitchFamily="49" charset="0"/>
-                <a:cs typeface="Courier New" panose="02070309020205020404" pitchFamily="49" charset="0"/>
-              </a:rPr>
-              <a:t>match</a:t>
-            </a:r>
-            <a:r>
-              <a:rPr lang="pl-PL" sz="1800" dirty="0">
-                <a:latin typeface="Courier New" panose="02070309020205020404" pitchFamily="49" charset="0"/>
-                <a:cs typeface="Courier New" panose="02070309020205020404" pitchFamily="49" charset="0"/>
-              </a:rPr>
-              <a:t> {</a:t>
-            </a:r>
-          </a:p>
-          <a:p>
-            <a:pPr marL="0" indent="0">
-              <a:buNone/>
-            </a:pPr>
-            <a:r>
-              <a:rPr lang="pl-PL" sz="1800" dirty="0" err="1">
-                <a:latin typeface="Courier New" panose="02070309020205020404" pitchFamily="49" charset="0"/>
-                <a:cs typeface="Courier New" panose="02070309020205020404" pitchFamily="49" charset="0"/>
-              </a:rPr>
-              <a:t>case</a:t>
-            </a:r>
-            <a:r>
-              <a:rPr lang="pl-PL" sz="1800" dirty="0">
-                <a:latin typeface="Courier New" panose="02070309020205020404" pitchFamily="49" charset="0"/>
-                <a:cs typeface="Courier New" panose="02070309020205020404" pitchFamily="49" charset="0"/>
-              </a:rPr>
-              <a:t> &lt;</a:t>
-            </a:r>
-            <a:r>
-              <a:rPr lang="pl-PL" sz="1800" dirty="0" err="1">
-                <a:latin typeface="Courier New" panose="02070309020205020404" pitchFamily="49" charset="0"/>
-                <a:cs typeface="Courier New" panose="02070309020205020404" pitchFamily="49" charset="0"/>
-              </a:rPr>
-              <a:t>pattern</a:t>
-            </a:r>
-            <a:r>
-              <a:rPr lang="pl-PL" sz="1800" dirty="0">
-                <a:latin typeface="Courier New" panose="02070309020205020404" pitchFamily="49" charset="0"/>
-                <a:cs typeface="Courier New" panose="02070309020205020404" pitchFamily="49" charset="0"/>
-              </a:rPr>
-              <a:t> </a:t>
-            </a:r>
-            <a:r>
-              <a:rPr lang="pl-PL" sz="1800" dirty="0" err="1">
-                <a:latin typeface="Courier New" panose="02070309020205020404" pitchFamily="49" charset="0"/>
-                <a:cs typeface="Courier New" panose="02070309020205020404" pitchFamily="49" charset="0"/>
-              </a:rPr>
-              <a:t>match</a:t>
-            </a:r>
-            <a:r>
-              <a:rPr lang="pl-PL" sz="1800" dirty="0">
-                <a:latin typeface="Courier New" panose="02070309020205020404" pitchFamily="49" charset="0"/>
-                <a:cs typeface="Courier New" panose="02070309020205020404" pitchFamily="49" charset="0"/>
-              </a:rPr>
-              <a:t>&gt; =&gt; &lt;</a:t>
-            </a:r>
-            <a:r>
-              <a:rPr lang="pl-PL" sz="1800" dirty="0" err="1">
-                <a:latin typeface="Courier New" panose="02070309020205020404" pitchFamily="49" charset="0"/>
-                <a:cs typeface="Courier New" panose="02070309020205020404" pitchFamily="49" charset="0"/>
-              </a:rPr>
-              <a:t>expression</a:t>
-            </a:r>
-            <a:r>
-              <a:rPr lang="pl-PL" sz="1800" dirty="0">
-                <a:latin typeface="Courier New" panose="02070309020205020404" pitchFamily="49" charset="0"/>
-                <a:cs typeface="Courier New" panose="02070309020205020404" pitchFamily="49" charset="0"/>
-              </a:rPr>
-              <a:t>&gt;</a:t>
-            </a:r>
-          </a:p>
-          <a:p>
-            <a:pPr marL="0" indent="0">
-              <a:buNone/>
-            </a:pPr>
-            <a:r>
-              <a:rPr lang="pl-PL" sz="1800" dirty="0">
-                <a:latin typeface="Courier New" panose="02070309020205020404" pitchFamily="49" charset="0"/>
-                <a:cs typeface="Courier New" panose="02070309020205020404" pitchFamily="49" charset="0"/>
-              </a:rPr>
-              <a:t>[</a:t>
-            </a:r>
-            <a:r>
-              <a:rPr lang="pl-PL" sz="1800" dirty="0" err="1">
-                <a:latin typeface="Courier New" panose="02070309020205020404" pitchFamily="49" charset="0"/>
-                <a:cs typeface="Courier New" panose="02070309020205020404" pitchFamily="49" charset="0"/>
-              </a:rPr>
-              <a:t>case</a:t>
-            </a:r>
-            <a:r>
-              <a:rPr lang="pl-PL" sz="1800" dirty="0">
-                <a:latin typeface="Courier New" panose="02070309020205020404" pitchFamily="49" charset="0"/>
-                <a:cs typeface="Courier New" panose="02070309020205020404" pitchFamily="49" charset="0"/>
-              </a:rPr>
-              <a:t>...]</a:t>
-            </a:r>
-          </a:p>
-          <a:p>
-            <a:pPr marL="0" indent="0">
-              <a:buNone/>
-            </a:pPr>
-            <a:r>
-              <a:rPr lang="pl-PL" sz="1800" dirty="0">
-                <a:latin typeface="Courier New" panose="02070309020205020404" pitchFamily="49" charset="0"/>
-                <a:cs typeface="Courier New" panose="02070309020205020404" pitchFamily="49" charset="0"/>
-              </a:rPr>
-              <a:t>}</a:t>
-            </a:r>
-            <a:endParaRPr lang="pl-PL" sz="3200" dirty="0">
-              <a:latin typeface="Courier New" panose="02070309020205020404" pitchFamily="49" charset="0"/>
-              <a:cs typeface="Courier New" panose="02070309020205020404" pitchFamily="49" charset="0"/>
-            </a:endParaRPr>
+            <a:endParaRPr lang="pl-PL" sz="2000" dirty="0"/>
           </a:p>
           <a:p>
             <a:endParaRPr lang="en-US" sz="2000" dirty="0"/>
@@ -10639,7 +11863,7 @@
     </p:spTree>
     <p:extLst>
       <p:ext uri="{BB962C8B-B14F-4D97-AF65-F5344CB8AC3E}">
-        <p14:creationId xmlns:p14="http://schemas.microsoft.com/office/powerpoint/2010/main" val="3173888047"/>
+        <p14:creationId xmlns:p14="http://schemas.microsoft.com/office/powerpoint/2010/main" val="2199849601"/>
       </p:ext>
     </p:extLst>
   </p:cSld>
@@ -12931,6 +14155,10 @@
             <a:r>
               <a:rPr lang="en-US" sz="2000" dirty="0" err="1"/>
               <a:t>ombine</a:t>
+            </a:r>
+            <a:r>
+              <a:rPr lang="pl-PL" sz="2000" dirty="0"/>
+              <a:t>s</a:t>
             </a:r>
             <a:r>
               <a:rPr lang="en-US" sz="2000" dirty="0"/>
@@ -16041,10 +17269,10 @@
       </p:sp>
       <p:pic>
         <p:nvPicPr>
-          <p:cNvPr id="5" name="Picture 4">
+          <p:cNvPr id="6" name="Picture 5">
             <a:extLst>
               <a:ext uri="{FF2B5EF4-FFF2-40B4-BE49-F238E27FC236}">
-                <a16:creationId xmlns:a16="http://schemas.microsoft.com/office/drawing/2014/main" id="{8A46501B-7203-4C5E-B187-C4BF90279956}"/>
+                <a16:creationId xmlns:a16="http://schemas.microsoft.com/office/drawing/2014/main" id="{C189DE04-FD4D-4034-BF7B-21C9EFCDE8A0}"/>
               </a:ext>
             </a:extLst>
           </p:cNvPr>
@@ -16054,15 +17282,15 @@
           <p:nvPr/>
         </p:nvPicPr>
         <p:blipFill>
-          <a:blip r:embed="rId2"/>
+          <a:blip r:embed="rId3"/>
           <a:stretch>
             <a:fillRect/>
           </a:stretch>
         </p:blipFill>
         <p:spPr>
           <a:xfrm>
-            <a:off x="2661405" y="1563638"/>
-            <a:ext cx="3960440" cy="1865976"/>
+            <a:off x="1943708" y="1419622"/>
+            <a:ext cx="5256584" cy="1991848"/>
           </a:xfrm>
           <a:prstGeom prst="rect">
             <a:avLst/>
@@ -16124,7 +17352,11 @@
             </a:br>
             <a:r>
               <a:rPr lang="pl-PL" dirty="0"/>
-              <a:t>Apache Spark Architecture</a:t>
+              <a:t>Apache Spark </a:t>
+            </a:r>
+            <a:r>
+              <a:rPr lang="pl-PL" dirty="0" err="1"/>
+              <a:t>APIs</a:t>
             </a:r>
             <a:endParaRPr lang="en-US" dirty="0"/>
           </a:p>
@@ -16240,10 +17472,10 @@
       </p:sp>
       <p:pic>
         <p:nvPicPr>
-          <p:cNvPr id="6" name="Picture 5">
+          <p:cNvPr id="8" name="Picture 7">
             <a:extLst>
               <a:ext uri="{FF2B5EF4-FFF2-40B4-BE49-F238E27FC236}">
-                <a16:creationId xmlns:a16="http://schemas.microsoft.com/office/drawing/2014/main" id="{E56C735E-26BD-4FF5-92B6-016E4ACB8DB5}"/>
+                <a16:creationId xmlns:a16="http://schemas.microsoft.com/office/drawing/2014/main" id="{AE13E914-2E72-4257-A276-A23EC8662AFE}"/>
               </a:ext>
             </a:extLst>
           </p:cNvPr>
@@ -16260,8 +17492,8 @@
         </p:blipFill>
         <p:spPr>
           <a:xfrm>
-            <a:off x="1619672" y="926072"/>
-            <a:ext cx="5602965" cy="3592377"/>
+            <a:off x="1999210" y="987574"/>
+            <a:ext cx="5145580" cy="3468502"/>
           </a:xfrm>
           <a:prstGeom prst="rect">
             <a:avLst/>
@@ -16271,7 +17503,7 @@
     </p:spTree>
     <p:extLst>
       <p:ext uri="{BB962C8B-B14F-4D97-AF65-F5344CB8AC3E}">
-        <p14:creationId xmlns:p14="http://schemas.microsoft.com/office/powerpoint/2010/main" val="1727686954"/>
+        <p14:creationId xmlns:p14="http://schemas.microsoft.com/office/powerpoint/2010/main" val="2390931764"/>
       </p:ext>
     </p:extLst>
   </p:cSld>

</xml_diff>